<commit_message>
many new code js,html, rdbms
</commit_message>
<xml_diff>
--- a/LTI_ASPNET_MVC/PPT/AdMVC  vs ADDMVCCore.pptx
+++ b/LTI_ASPNET_MVC/PPT/AdMVC  vs ADDMVCCore.pptx
@@ -9,7 +9,8 @@
     <p:sldId id="262" r:id="rId3"/>
     <p:sldId id="263" r:id="rId4"/>
     <p:sldId id="264" r:id="rId5"/>
-    <p:sldId id="259" r:id="rId6"/>
+    <p:sldId id="265" r:id="rId6"/>
+    <p:sldId id="259" r:id="rId7"/>
   </p:sldIdLst>
   <p:sldSz cx="12192000" cy="6858000"/>
   <p:notesSz cx="6858000" cy="9144000"/>
@@ -110,7 +111,7 @@
   </p:defaultTextStyle>
   <p:extLst>
     <p:ext uri="{EFAFB233-063F-42B5-8137-9DF3F51BA10A}">
-      <p15:sldGuideLst xmlns:p15="http://schemas.microsoft.com/office/powerpoint/2012/main"/>
+      <p15:sldGuideLst xmlns:p15="http://schemas.microsoft.com/office/powerpoint/2012/main" xmlns=""/>
     </p:ext>
   </p:extLst>
 </p:presentation>
@@ -138,7 +139,7 @@
           <p:cNvPr id="7" name="Rectangle 6">
             <a:extLst>
               <a:ext uri="{FF2B5EF4-FFF2-40B4-BE49-F238E27FC236}">
-                <a16:creationId xmlns:a16="http://schemas.microsoft.com/office/drawing/2014/main" id="{FB45BD54-D254-4322-AF58-CAE8257A3F82}"/>
+                <a16:creationId xmlns:a16="http://schemas.microsoft.com/office/drawing/2014/main" xmlns="" id="{FB45BD54-D254-4322-AF58-CAE8257A3F82}"/>
               </a:ext>
             </a:extLst>
           </p:cNvPr>
@@ -190,7 +191,7 @@
           <p:cNvPr id="8" name="Rectangle 7">
             <a:extLst>
               <a:ext uri="{FF2B5EF4-FFF2-40B4-BE49-F238E27FC236}">
-                <a16:creationId xmlns:a16="http://schemas.microsoft.com/office/drawing/2014/main" id="{F10DB2E3-BEBB-417E-9A38-25C15BFBA35A}"/>
+                <a16:creationId xmlns:a16="http://schemas.microsoft.com/office/drawing/2014/main" xmlns="" id="{F10DB2E3-BEBB-417E-9A38-25C15BFBA35A}"/>
               </a:ext>
             </a:extLst>
           </p:cNvPr>
@@ -247,7 +248,7 @@
           <p:cNvPr id="9" name="Picture 8">
             <a:extLst>
               <a:ext uri="{FF2B5EF4-FFF2-40B4-BE49-F238E27FC236}">
-                <a16:creationId xmlns:a16="http://schemas.microsoft.com/office/drawing/2014/main" id="{D263A75F-78DF-42A9-BC21-1C7D5E55C115}"/>
+                <a16:creationId xmlns:a16="http://schemas.microsoft.com/office/drawing/2014/main" xmlns="" id="{D263A75F-78DF-42A9-BC21-1C7D5E55C115}"/>
               </a:ext>
             </a:extLst>
           </p:cNvPr>
@@ -257,11 +258,11 @@
           <p:nvPr/>
         </p:nvPicPr>
         <p:blipFill>
-          <a:blip r:embed="rId2">
+          <a:blip r:embed="rId2" cstate="print">
             <a:biLevel thresh="25000"/>
             <a:extLst>
               <a:ext uri="{28A0092B-C50C-407E-A947-70E740481C1C}">
-                <a14:useLocalDpi xmlns:a14="http://schemas.microsoft.com/office/drawing/2010/main" val="0"/>
+                <a14:useLocalDpi xmlns:a14="http://schemas.microsoft.com/office/drawing/2010/main" xmlns="" val="0"/>
               </a:ext>
             </a:extLst>
           </a:blip>
@@ -284,7 +285,7 @@
           <p:cNvPr id="10" name="Rectangle 9">
             <a:extLst>
               <a:ext uri="{FF2B5EF4-FFF2-40B4-BE49-F238E27FC236}">
-                <a16:creationId xmlns:a16="http://schemas.microsoft.com/office/drawing/2014/main" id="{2B1FEF01-CFDC-4705-BBAE-88BD256BEE19}"/>
+                <a16:creationId xmlns:a16="http://schemas.microsoft.com/office/drawing/2014/main" xmlns="" id="{2B1FEF01-CFDC-4705-BBAE-88BD256BEE19}"/>
               </a:ext>
             </a:extLst>
           </p:cNvPr>
@@ -346,7 +347,7 @@
           <p:cNvPr id="11" name="Rectangle 10">
             <a:extLst>
               <a:ext uri="{FF2B5EF4-FFF2-40B4-BE49-F238E27FC236}">
-                <a16:creationId xmlns:a16="http://schemas.microsoft.com/office/drawing/2014/main" id="{776D622D-9BE6-4C9D-8064-B078A5E909E2}"/>
+                <a16:creationId xmlns:a16="http://schemas.microsoft.com/office/drawing/2014/main" xmlns="" id="{776D622D-9BE6-4C9D-8064-B078A5E909E2}"/>
               </a:ext>
             </a:extLst>
           </p:cNvPr>
@@ -408,7 +409,7 @@
           <p:cNvPr id="12" name="Rectangle 11">
             <a:extLst>
               <a:ext uri="{FF2B5EF4-FFF2-40B4-BE49-F238E27FC236}">
-                <a16:creationId xmlns:a16="http://schemas.microsoft.com/office/drawing/2014/main" id="{7B9C8AFD-31CF-44B5-815D-F706827DA94E}"/>
+                <a16:creationId xmlns:a16="http://schemas.microsoft.com/office/drawing/2014/main" xmlns="" id="{7B9C8AFD-31CF-44B5-815D-F706827DA94E}"/>
               </a:ext>
             </a:extLst>
           </p:cNvPr>
@@ -470,7 +471,7 @@
           <p:cNvPr id="13" name="Rectangle 12">
             <a:extLst>
               <a:ext uri="{FF2B5EF4-FFF2-40B4-BE49-F238E27FC236}">
-                <a16:creationId xmlns:a16="http://schemas.microsoft.com/office/drawing/2014/main" id="{CCB5F93B-4C98-41CB-94D6-75C066006312}"/>
+                <a16:creationId xmlns:a16="http://schemas.microsoft.com/office/drawing/2014/main" xmlns="" id="{CCB5F93B-4C98-41CB-94D6-75C066006312}"/>
               </a:ext>
             </a:extLst>
           </p:cNvPr>
@@ -532,7 +533,7 @@
           <p:cNvPr id="14" name="Picture 13">
             <a:extLst>
               <a:ext uri="{FF2B5EF4-FFF2-40B4-BE49-F238E27FC236}">
-                <a16:creationId xmlns:a16="http://schemas.microsoft.com/office/drawing/2014/main" id="{0F325318-E234-4F36-8B87-16BA513E587C}"/>
+                <a16:creationId xmlns:a16="http://schemas.microsoft.com/office/drawing/2014/main" xmlns="" id="{0F325318-E234-4F36-8B87-16BA513E587C}"/>
               </a:ext>
             </a:extLst>
           </p:cNvPr>
@@ -542,10 +543,10 @@
           <p:nvPr/>
         </p:nvPicPr>
         <p:blipFill>
-          <a:blip r:embed="rId3">
+          <a:blip r:embed="rId3" cstate="print">
             <a:extLst>
               <a:ext uri="{28A0092B-C50C-407E-A947-70E740481C1C}">
-                <a14:useLocalDpi xmlns:a14="http://schemas.microsoft.com/office/drawing/2010/main" val="0"/>
+                <a14:useLocalDpi xmlns:a14="http://schemas.microsoft.com/office/drawing/2010/main" xmlns="" val="0"/>
               </a:ext>
             </a:extLst>
           </a:blip>
@@ -568,7 +569,7 @@
           <p:cNvPr id="15" name="Picture 14">
             <a:extLst>
               <a:ext uri="{FF2B5EF4-FFF2-40B4-BE49-F238E27FC236}">
-                <a16:creationId xmlns:a16="http://schemas.microsoft.com/office/drawing/2014/main" id="{33C151AA-4A07-419B-9ED6-CEF6AC61C135}"/>
+                <a16:creationId xmlns:a16="http://schemas.microsoft.com/office/drawing/2014/main" xmlns="" id="{33C151AA-4A07-419B-9ED6-CEF6AC61C135}"/>
               </a:ext>
             </a:extLst>
           </p:cNvPr>
@@ -578,10 +579,10 @@
           <p:nvPr/>
         </p:nvPicPr>
         <p:blipFill>
-          <a:blip r:embed="rId4">
+          <a:blip r:embed="rId4" cstate="print">
             <a:extLst>
               <a:ext uri="{28A0092B-C50C-407E-A947-70E740481C1C}">
-                <a14:useLocalDpi xmlns:a14="http://schemas.microsoft.com/office/drawing/2010/main" val="0"/>
+                <a14:useLocalDpi xmlns:a14="http://schemas.microsoft.com/office/drawing/2010/main" xmlns="" val="0"/>
               </a:ext>
             </a:extLst>
           </a:blip>
@@ -604,7 +605,7 @@
           <p:cNvPr id="2" name="Title 1">
             <a:extLst>
               <a:ext uri="{FF2B5EF4-FFF2-40B4-BE49-F238E27FC236}">
-                <a16:creationId xmlns:a16="http://schemas.microsoft.com/office/drawing/2014/main" id="{357F1B1E-B7D1-4F84-BC64-4CE0DB37DA10}"/>
+                <a16:creationId xmlns:a16="http://schemas.microsoft.com/office/drawing/2014/main" xmlns="" id="{357F1B1E-B7D1-4F84-BC64-4CE0DB37DA10}"/>
               </a:ext>
             </a:extLst>
           </p:cNvPr>
@@ -652,7 +653,7 @@
           <p:cNvPr id="3" name="Subtitle 2">
             <a:extLst>
               <a:ext uri="{FF2B5EF4-FFF2-40B4-BE49-F238E27FC236}">
-                <a16:creationId xmlns:a16="http://schemas.microsoft.com/office/drawing/2014/main" id="{EE486D6E-6BA8-4C52-924A-59253267AF57}"/>
+                <a16:creationId xmlns:a16="http://schemas.microsoft.com/office/drawing/2014/main" xmlns="" id="{EE486D6E-6BA8-4C52-924A-59253267AF57}"/>
               </a:ext>
             </a:extLst>
           </p:cNvPr>
@@ -728,7 +729,7 @@
           <p:cNvPr id="4" name="Date Placeholder 3">
             <a:extLst>
               <a:ext uri="{FF2B5EF4-FFF2-40B4-BE49-F238E27FC236}">
-                <a16:creationId xmlns:a16="http://schemas.microsoft.com/office/drawing/2014/main" id="{D3A3C5C8-6BE2-42E9-8B5A-2ED21D041198}"/>
+                <a16:creationId xmlns:a16="http://schemas.microsoft.com/office/drawing/2014/main" xmlns="" id="{D3A3C5C8-6BE2-42E9-8B5A-2ED21D041198}"/>
               </a:ext>
             </a:extLst>
           </p:cNvPr>
@@ -746,7 +747,8 @@
           <a:p>
             <a:fld id="{D2474CCF-98B4-411A-8810-C31E8C29E19B}" type="datetimeFigureOut">
               <a:rPr lang="en-US" smtClean="0"/>
-              <a:t>6/11/2022</a:t>
+              <a:pPr/>
+              <a:t>7/6/2023</a:t>
             </a:fld>
             <a:endParaRPr lang="en-US"/>
           </a:p>
@@ -757,7 +759,7 @@
           <p:cNvPr id="5" name="Footer Placeholder 4">
             <a:extLst>
               <a:ext uri="{FF2B5EF4-FFF2-40B4-BE49-F238E27FC236}">
-                <a16:creationId xmlns:a16="http://schemas.microsoft.com/office/drawing/2014/main" id="{5318EDC7-CDC2-4407-9F8F-C0CEAA400966}"/>
+                <a16:creationId xmlns:a16="http://schemas.microsoft.com/office/drawing/2014/main" xmlns="" id="{5318EDC7-CDC2-4407-9F8F-C0CEAA400966}"/>
               </a:ext>
             </a:extLst>
           </p:cNvPr>
@@ -782,7 +784,7 @@
           <p:cNvPr id="6" name="Slide Number Placeholder 5">
             <a:extLst>
               <a:ext uri="{FF2B5EF4-FFF2-40B4-BE49-F238E27FC236}">
-                <a16:creationId xmlns:a16="http://schemas.microsoft.com/office/drawing/2014/main" id="{B6F695F3-58FF-4760-B1DC-C5025EA66D87}"/>
+                <a16:creationId xmlns:a16="http://schemas.microsoft.com/office/drawing/2014/main" xmlns="" id="{B6F695F3-58FF-4760-B1DC-C5025EA66D87}"/>
               </a:ext>
             </a:extLst>
           </p:cNvPr>
@@ -800,6 +802,7 @@
           <a:p>
             <a:fld id="{A1FD0E78-183D-4F7D-A18B-8A4BED7B6988}" type="slidenum">
               <a:rPr lang="en-US" smtClean="0"/>
+              <a:pPr/>
               <a:t>‹#›</a:t>
             </a:fld>
             <a:endParaRPr lang="en-US"/>
@@ -811,7 +814,7 @@
           <p:cNvPr id="17" name="Straight Connector 16">
             <a:extLst>
               <a:ext uri="{FF2B5EF4-FFF2-40B4-BE49-F238E27FC236}">
-                <a16:creationId xmlns:a16="http://schemas.microsoft.com/office/drawing/2014/main" id="{70565CEE-49E5-468C-A0B4-83E886C61D84}"/>
+                <a16:creationId xmlns:a16="http://schemas.microsoft.com/office/drawing/2014/main" xmlns="" id="{70565CEE-49E5-468C-A0B4-83E886C61D84}"/>
               </a:ext>
             </a:extLst>
           </p:cNvPr>
@@ -847,7 +850,7 @@
           <p:cNvPr id="18" name="Freeform: Shape 17">
             <a:extLst>
               <a:ext uri="{FF2B5EF4-FFF2-40B4-BE49-F238E27FC236}">
-                <a16:creationId xmlns:a16="http://schemas.microsoft.com/office/drawing/2014/main" id="{740C7E80-A24C-4396-B051-437EF1D79AB8}"/>
+                <a16:creationId xmlns:a16="http://schemas.microsoft.com/office/drawing/2014/main" xmlns="" id="{740C7E80-A24C-4396-B051-437EF1D79AB8}"/>
               </a:ext>
             </a:extLst>
           </p:cNvPr>
@@ -944,7 +947,7 @@
           <p:cNvPr id="19" name="Freeform: Shape 18">
             <a:extLst>
               <a:ext uri="{FF2B5EF4-FFF2-40B4-BE49-F238E27FC236}">
-                <a16:creationId xmlns:a16="http://schemas.microsoft.com/office/drawing/2014/main" id="{C52EBDC4-1E90-4F52-92F1-8C4F5999C539}"/>
+                <a16:creationId xmlns:a16="http://schemas.microsoft.com/office/drawing/2014/main" xmlns="" id="{C52EBDC4-1E90-4F52-92F1-8C4F5999C539}"/>
               </a:ext>
             </a:extLst>
           </p:cNvPr>
@@ -1039,7 +1042,7 @@
     </p:spTree>
     <p:extLst>
       <p:ext uri="{BB962C8B-B14F-4D97-AF65-F5344CB8AC3E}">
-        <p14:creationId xmlns:p14="http://schemas.microsoft.com/office/powerpoint/2010/main" val="1137530690"/>
+        <p14:creationId xmlns:p14="http://schemas.microsoft.com/office/powerpoint/2010/main" xmlns="" val="1137530690"/>
       </p:ext>
     </p:extLst>
   </p:cSld>
@@ -1071,7 +1074,7 @@
           <p:cNvPr id="2" name="Title 1">
             <a:extLst>
               <a:ext uri="{FF2B5EF4-FFF2-40B4-BE49-F238E27FC236}">
-                <a16:creationId xmlns:a16="http://schemas.microsoft.com/office/drawing/2014/main" id="{954B1346-0FB6-45C7-A96E-DBDDF4C7C069}"/>
+                <a16:creationId xmlns:a16="http://schemas.microsoft.com/office/drawing/2014/main" xmlns="" id="{954B1346-0FB6-45C7-A96E-DBDDF4C7C069}"/>
               </a:ext>
             </a:extLst>
           </p:cNvPr>
@@ -1099,7 +1102,7 @@
           <p:cNvPr id="3" name="Vertical Text Placeholder 2">
             <a:extLst>
               <a:ext uri="{FF2B5EF4-FFF2-40B4-BE49-F238E27FC236}">
-                <a16:creationId xmlns:a16="http://schemas.microsoft.com/office/drawing/2014/main" id="{5C29AF55-8DB4-4235-B18B-7CA1658AEA7D}"/>
+                <a16:creationId xmlns:a16="http://schemas.microsoft.com/office/drawing/2014/main" xmlns="" id="{5C29AF55-8DB4-4235-B18B-7CA1658AEA7D}"/>
               </a:ext>
             </a:extLst>
           </p:cNvPr>
@@ -1156,7 +1159,7 @@
           <p:cNvPr id="4" name="Date Placeholder 3">
             <a:extLst>
               <a:ext uri="{FF2B5EF4-FFF2-40B4-BE49-F238E27FC236}">
-                <a16:creationId xmlns:a16="http://schemas.microsoft.com/office/drawing/2014/main" id="{1AF36DFF-55B4-41FE-BF5D-FC115ECB708B}"/>
+                <a16:creationId xmlns:a16="http://schemas.microsoft.com/office/drawing/2014/main" xmlns="" id="{1AF36DFF-55B4-41FE-BF5D-FC115ECB708B}"/>
               </a:ext>
             </a:extLst>
           </p:cNvPr>
@@ -1174,7 +1177,8 @@
           <a:p>
             <a:fld id="{D2474CCF-98B4-411A-8810-C31E8C29E19B}" type="datetimeFigureOut">
               <a:rPr lang="en-US" smtClean="0"/>
-              <a:t>6/11/2022</a:t>
+              <a:pPr/>
+              <a:t>7/6/2023</a:t>
             </a:fld>
             <a:endParaRPr lang="en-US"/>
           </a:p>
@@ -1185,7 +1189,7 @@
           <p:cNvPr id="5" name="Footer Placeholder 4">
             <a:extLst>
               <a:ext uri="{FF2B5EF4-FFF2-40B4-BE49-F238E27FC236}">
-                <a16:creationId xmlns:a16="http://schemas.microsoft.com/office/drawing/2014/main" id="{CB1B04A8-2C06-4BAA-A780-6380C576F998}"/>
+                <a16:creationId xmlns:a16="http://schemas.microsoft.com/office/drawing/2014/main" xmlns="" id="{CB1B04A8-2C06-4BAA-A780-6380C576F998}"/>
               </a:ext>
             </a:extLst>
           </p:cNvPr>
@@ -1210,7 +1214,7 @@
           <p:cNvPr id="6" name="Slide Number Placeholder 5">
             <a:extLst>
               <a:ext uri="{FF2B5EF4-FFF2-40B4-BE49-F238E27FC236}">
-                <a16:creationId xmlns:a16="http://schemas.microsoft.com/office/drawing/2014/main" id="{5A3476E6-F3EA-4F13-B40F-1978B532D33E}"/>
+                <a16:creationId xmlns:a16="http://schemas.microsoft.com/office/drawing/2014/main" xmlns="" id="{5A3476E6-F3EA-4F13-B40F-1978B532D33E}"/>
               </a:ext>
             </a:extLst>
           </p:cNvPr>
@@ -1228,6 +1232,7 @@
           <a:p>
             <a:fld id="{A1FD0E78-183D-4F7D-A18B-8A4BED7B6988}" type="slidenum">
               <a:rPr lang="en-US" smtClean="0"/>
+              <a:pPr/>
               <a:t>‹#›</a:t>
             </a:fld>
             <a:endParaRPr lang="en-US"/>
@@ -1237,7 +1242,7 @@
     </p:spTree>
     <p:extLst>
       <p:ext uri="{BB962C8B-B14F-4D97-AF65-F5344CB8AC3E}">
-        <p14:creationId xmlns:p14="http://schemas.microsoft.com/office/powerpoint/2010/main" val="1738558996"/>
+        <p14:creationId xmlns:p14="http://schemas.microsoft.com/office/powerpoint/2010/main" xmlns="" val="1738558996"/>
       </p:ext>
     </p:extLst>
   </p:cSld>
@@ -1269,7 +1274,7 @@
           <p:cNvPr id="2" name="Vertical Title 1">
             <a:extLst>
               <a:ext uri="{FF2B5EF4-FFF2-40B4-BE49-F238E27FC236}">
-                <a16:creationId xmlns:a16="http://schemas.microsoft.com/office/drawing/2014/main" id="{8BDEE29A-7B74-4351-AF12-4B1C4A1C76B4}"/>
+                <a16:creationId xmlns:a16="http://schemas.microsoft.com/office/drawing/2014/main" xmlns="" id="{8BDEE29A-7B74-4351-AF12-4B1C4A1C76B4}"/>
               </a:ext>
             </a:extLst>
           </p:cNvPr>
@@ -1302,7 +1307,7 @@
           <p:cNvPr id="3" name="Vertical Text Placeholder 2">
             <a:extLst>
               <a:ext uri="{FF2B5EF4-FFF2-40B4-BE49-F238E27FC236}">
-                <a16:creationId xmlns:a16="http://schemas.microsoft.com/office/drawing/2014/main" id="{003DBD61-8BBB-4413-B521-69C6BA2EBDB8}"/>
+                <a16:creationId xmlns:a16="http://schemas.microsoft.com/office/drawing/2014/main" xmlns="" id="{003DBD61-8BBB-4413-B521-69C6BA2EBDB8}"/>
               </a:ext>
             </a:extLst>
           </p:cNvPr>
@@ -1364,7 +1369,7 @@
           <p:cNvPr id="4" name="Date Placeholder 3">
             <a:extLst>
               <a:ext uri="{FF2B5EF4-FFF2-40B4-BE49-F238E27FC236}">
-                <a16:creationId xmlns:a16="http://schemas.microsoft.com/office/drawing/2014/main" id="{83B486CF-3404-43E2-AAB7-B052FC466837}"/>
+                <a16:creationId xmlns:a16="http://schemas.microsoft.com/office/drawing/2014/main" xmlns="" id="{83B486CF-3404-43E2-AAB7-B052FC466837}"/>
               </a:ext>
             </a:extLst>
           </p:cNvPr>
@@ -1382,7 +1387,8 @@
           <a:p>
             <a:fld id="{D2474CCF-98B4-411A-8810-C31E8C29E19B}" type="datetimeFigureOut">
               <a:rPr lang="en-US" smtClean="0"/>
-              <a:t>6/11/2022</a:t>
+              <a:pPr/>
+              <a:t>7/6/2023</a:t>
             </a:fld>
             <a:endParaRPr lang="en-US"/>
           </a:p>
@@ -1393,7 +1399,7 @@
           <p:cNvPr id="5" name="Footer Placeholder 4">
             <a:extLst>
               <a:ext uri="{FF2B5EF4-FFF2-40B4-BE49-F238E27FC236}">
-                <a16:creationId xmlns:a16="http://schemas.microsoft.com/office/drawing/2014/main" id="{F37AE448-840B-441A-88AC-D0E89CE174BF}"/>
+                <a16:creationId xmlns:a16="http://schemas.microsoft.com/office/drawing/2014/main" xmlns="" id="{F37AE448-840B-441A-88AC-D0E89CE174BF}"/>
               </a:ext>
             </a:extLst>
           </p:cNvPr>
@@ -1418,7 +1424,7 @@
           <p:cNvPr id="6" name="Slide Number Placeholder 5">
             <a:extLst>
               <a:ext uri="{FF2B5EF4-FFF2-40B4-BE49-F238E27FC236}">
-                <a16:creationId xmlns:a16="http://schemas.microsoft.com/office/drawing/2014/main" id="{E3356B10-E457-4193-8E4C-4179814527ED}"/>
+                <a16:creationId xmlns:a16="http://schemas.microsoft.com/office/drawing/2014/main" xmlns="" id="{E3356B10-E457-4193-8E4C-4179814527ED}"/>
               </a:ext>
             </a:extLst>
           </p:cNvPr>
@@ -1436,6 +1442,7 @@
           <a:p>
             <a:fld id="{A1FD0E78-183D-4F7D-A18B-8A4BED7B6988}" type="slidenum">
               <a:rPr lang="en-US" smtClean="0"/>
+              <a:pPr/>
               <a:t>‹#›</a:t>
             </a:fld>
             <a:endParaRPr lang="en-US"/>
@@ -1445,7 +1452,7 @@
     </p:spTree>
     <p:extLst>
       <p:ext uri="{BB962C8B-B14F-4D97-AF65-F5344CB8AC3E}">
-        <p14:creationId xmlns:p14="http://schemas.microsoft.com/office/powerpoint/2010/main" val="1506037322"/>
+        <p14:creationId xmlns:p14="http://schemas.microsoft.com/office/powerpoint/2010/main" xmlns="" val="1506037322"/>
       </p:ext>
     </p:extLst>
   </p:cSld>
@@ -1477,7 +1484,7 @@
           <p:cNvPr id="7" name="Rectangle 6">
             <a:extLst>
               <a:ext uri="{FF2B5EF4-FFF2-40B4-BE49-F238E27FC236}">
-                <a16:creationId xmlns:a16="http://schemas.microsoft.com/office/drawing/2014/main" id="{A8C48660-697D-4BB9-97F6-A5BB6C764668}"/>
+                <a16:creationId xmlns:a16="http://schemas.microsoft.com/office/drawing/2014/main" xmlns="" id="{A8C48660-697D-4BB9-97F6-A5BB6C764668}"/>
               </a:ext>
             </a:extLst>
           </p:cNvPr>
@@ -1526,7 +1533,7 @@
           <p:cNvPr id="8" name="Rectangle 7">
             <a:extLst>
               <a:ext uri="{FF2B5EF4-FFF2-40B4-BE49-F238E27FC236}">
-                <a16:creationId xmlns:a16="http://schemas.microsoft.com/office/drawing/2014/main" id="{BD0BE8EE-2EB2-435C-9D5A-AAA15842A36C}"/>
+                <a16:creationId xmlns:a16="http://schemas.microsoft.com/office/drawing/2014/main" xmlns="" id="{BD0BE8EE-2EB2-435C-9D5A-AAA15842A36C}"/>
               </a:ext>
             </a:extLst>
           </p:cNvPr>
@@ -1583,7 +1590,7 @@
           <p:cNvPr id="9" name="Rectangle 8">
             <a:extLst>
               <a:ext uri="{FF2B5EF4-FFF2-40B4-BE49-F238E27FC236}">
-                <a16:creationId xmlns:a16="http://schemas.microsoft.com/office/drawing/2014/main" id="{423355C8-5657-4103-B600-59803F24DBFF}"/>
+                <a16:creationId xmlns:a16="http://schemas.microsoft.com/office/drawing/2014/main" xmlns="" id="{423355C8-5657-4103-B600-59803F24DBFF}"/>
               </a:ext>
             </a:extLst>
           </p:cNvPr>
@@ -1645,7 +1652,7 @@
           <p:cNvPr id="10" name="Rectangle 9">
             <a:extLst>
               <a:ext uri="{FF2B5EF4-FFF2-40B4-BE49-F238E27FC236}">
-                <a16:creationId xmlns:a16="http://schemas.microsoft.com/office/drawing/2014/main" id="{CFF2C038-CD71-4DD5-AD56-49FB9C0E8AF6}"/>
+                <a16:creationId xmlns:a16="http://schemas.microsoft.com/office/drawing/2014/main" xmlns="" id="{CFF2C038-CD71-4DD5-AD56-49FB9C0E8AF6}"/>
               </a:ext>
             </a:extLst>
           </p:cNvPr>
@@ -1707,7 +1714,7 @@
           <p:cNvPr id="11" name="Rectangle 10">
             <a:extLst>
               <a:ext uri="{FF2B5EF4-FFF2-40B4-BE49-F238E27FC236}">
-                <a16:creationId xmlns:a16="http://schemas.microsoft.com/office/drawing/2014/main" id="{D626EA1A-6BCF-4846-ABF3-498AD8F1EC82}"/>
+                <a16:creationId xmlns:a16="http://schemas.microsoft.com/office/drawing/2014/main" xmlns="" id="{D626EA1A-6BCF-4846-ABF3-498AD8F1EC82}"/>
               </a:ext>
             </a:extLst>
           </p:cNvPr>
@@ -1769,7 +1776,7 @@
           <p:cNvPr id="12" name="Rectangle 11">
             <a:extLst>
               <a:ext uri="{FF2B5EF4-FFF2-40B4-BE49-F238E27FC236}">
-                <a16:creationId xmlns:a16="http://schemas.microsoft.com/office/drawing/2014/main" id="{E91F1E9A-33FE-49BA-B69E-30EA3CC61DB9}"/>
+                <a16:creationId xmlns:a16="http://schemas.microsoft.com/office/drawing/2014/main" xmlns="" id="{E91F1E9A-33FE-49BA-B69E-30EA3CC61DB9}"/>
               </a:ext>
             </a:extLst>
           </p:cNvPr>
@@ -1831,7 +1838,7 @@
           <p:cNvPr id="13" name="Picture 12">
             <a:extLst>
               <a:ext uri="{FF2B5EF4-FFF2-40B4-BE49-F238E27FC236}">
-                <a16:creationId xmlns:a16="http://schemas.microsoft.com/office/drawing/2014/main" id="{B9CD68B3-2898-4D6B-B5C2-F62D51C485D5}"/>
+                <a16:creationId xmlns:a16="http://schemas.microsoft.com/office/drawing/2014/main" xmlns="" id="{B9CD68B3-2898-4D6B-B5C2-F62D51C485D5}"/>
               </a:ext>
             </a:extLst>
           </p:cNvPr>
@@ -1841,10 +1848,10 @@
           <p:nvPr/>
         </p:nvPicPr>
         <p:blipFill>
-          <a:blip r:embed="rId2">
+          <a:blip r:embed="rId2" cstate="print">
             <a:extLst>
               <a:ext uri="{28A0092B-C50C-407E-A947-70E740481C1C}">
-                <a14:useLocalDpi xmlns:a14="http://schemas.microsoft.com/office/drawing/2010/main" val="0"/>
+                <a14:useLocalDpi xmlns:a14="http://schemas.microsoft.com/office/drawing/2010/main" xmlns="" val="0"/>
               </a:ext>
             </a:extLst>
           </a:blip>
@@ -1867,7 +1874,7 @@
           <p:cNvPr id="14" name="Group 13">
             <a:extLst>
               <a:ext uri="{FF2B5EF4-FFF2-40B4-BE49-F238E27FC236}">
-                <a16:creationId xmlns:a16="http://schemas.microsoft.com/office/drawing/2014/main" id="{C4873B59-2742-4F87-99A9-E1AA8FCD8E50}"/>
+                <a16:creationId xmlns:a16="http://schemas.microsoft.com/office/drawing/2014/main" xmlns="" id="{C4873B59-2742-4F87-99A9-E1AA8FCD8E50}"/>
               </a:ext>
             </a:extLst>
           </p:cNvPr>
@@ -1887,7 +1894,7 @@
             <p:cNvPr id="15" name="Picture 14">
               <a:extLst>
                 <a:ext uri="{FF2B5EF4-FFF2-40B4-BE49-F238E27FC236}">
-                  <a16:creationId xmlns:a16="http://schemas.microsoft.com/office/drawing/2014/main" id="{289441B2-4EF5-4599-887F-42F7A59ADD20}"/>
+                  <a16:creationId xmlns:a16="http://schemas.microsoft.com/office/drawing/2014/main" xmlns="" id="{289441B2-4EF5-4599-887F-42F7A59ADD20}"/>
                 </a:ext>
               </a:extLst>
             </p:cNvPr>
@@ -1897,10 +1904,10 @@
             <p:nvPr/>
           </p:nvPicPr>
           <p:blipFill>
-            <a:blip r:embed="rId3">
+            <a:blip r:embed="rId3" cstate="print">
               <a:extLst>
                 <a:ext uri="{28A0092B-C50C-407E-A947-70E740481C1C}">
-                  <a14:useLocalDpi xmlns:a14="http://schemas.microsoft.com/office/drawing/2010/main" val="0"/>
+                  <a14:useLocalDpi xmlns:a14="http://schemas.microsoft.com/office/drawing/2010/main" xmlns="" val="0"/>
                 </a:ext>
               </a:extLst>
             </a:blip>
@@ -1923,7 +1930,7 @@
             <p:cNvPr id="16" name="Rectangle 15">
               <a:extLst>
                 <a:ext uri="{FF2B5EF4-FFF2-40B4-BE49-F238E27FC236}">
-                  <a16:creationId xmlns:a16="http://schemas.microsoft.com/office/drawing/2014/main" id="{C4F730E1-3FAD-4138-ACCA-276E0BBA031B}"/>
+                  <a16:creationId xmlns:a16="http://schemas.microsoft.com/office/drawing/2014/main" xmlns="" id="{C4F730E1-3FAD-4138-ACCA-276E0BBA031B}"/>
                 </a:ext>
               </a:extLst>
             </p:cNvPr>
@@ -1978,7 +1985,7 @@
           <p:cNvPr id="2" name="Title 1">
             <a:extLst>
               <a:ext uri="{FF2B5EF4-FFF2-40B4-BE49-F238E27FC236}">
-                <a16:creationId xmlns:a16="http://schemas.microsoft.com/office/drawing/2014/main" id="{3F08D64F-302C-4B73-A9F2-946CA338260A}"/>
+                <a16:creationId xmlns:a16="http://schemas.microsoft.com/office/drawing/2014/main" xmlns="" id="{3F08D64F-302C-4B73-A9F2-946CA338260A}"/>
               </a:ext>
             </a:extLst>
           </p:cNvPr>
@@ -2024,7 +2031,7 @@
           <p:cNvPr id="3" name="Content Placeholder 2">
             <a:extLst>
               <a:ext uri="{FF2B5EF4-FFF2-40B4-BE49-F238E27FC236}">
-                <a16:creationId xmlns:a16="http://schemas.microsoft.com/office/drawing/2014/main" id="{372EB2DC-2ADD-4476-921C-5457C12D154E}"/>
+                <a16:creationId xmlns:a16="http://schemas.microsoft.com/office/drawing/2014/main" xmlns="" id="{372EB2DC-2ADD-4476-921C-5457C12D154E}"/>
               </a:ext>
             </a:extLst>
           </p:cNvPr>
@@ -2140,7 +2147,7 @@
           <p:cNvPr id="4" name="Date Placeholder 3">
             <a:extLst>
               <a:ext uri="{FF2B5EF4-FFF2-40B4-BE49-F238E27FC236}">
-                <a16:creationId xmlns:a16="http://schemas.microsoft.com/office/drawing/2014/main" id="{C68B0C41-3748-45BA-AC12-3356750D6CCC}"/>
+                <a16:creationId xmlns:a16="http://schemas.microsoft.com/office/drawing/2014/main" xmlns="" id="{C68B0C41-3748-45BA-AC12-3356750D6CCC}"/>
               </a:ext>
             </a:extLst>
           </p:cNvPr>
@@ -2158,7 +2165,8 @@
           <a:p>
             <a:fld id="{D2474CCF-98B4-411A-8810-C31E8C29E19B}" type="datetimeFigureOut">
               <a:rPr lang="en-US" smtClean="0"/>
-              <a:t>6/11/2022</a:t>
+              <a:pPr/>
+              <a:t>7/6/2023</a:t>
             </a:fld>
             <a:endParaRPr lang="en-US"/>
           </a:p>
@@ -2169,7 +2177,7 @@
           <p:cNvPr id="5" name="Footer Placeholder 4">
             <a:extLst>
               <a:ext uri="{FF2B5EF4-FFF2-40B4-BE49-F238E27FC236}">
-                <a16:creationId xmlns:a16="http://schemas.microsoft.com/office/drawing/2014/main" id="{B2BC5298-80C2-435C-BE19-55A311B75B01}"/>
+                <a16:creationId xmlns:a16="http://schemas.microsoft.com/office/drawing/2014/main" xmlns="" id="{B2BC5298-80C2-435C-BE19-55A311B75B01}"/>
               </a:ext>
             </a:extLst>
           </p:cNvPr>
@@ -2194,7 +2202,7 @@
           <p:cNvPr id="6" name="Slide Number Placeholder 5">
             <a:extLst>
               <a:ext uri="{FF2B5EF4-FFF2-40B4-BE49-F238E27FC236}">
-                <a16:creationId xmlns:a16="http://schemas.microsoft.com/office/drawing/2014/main" id="{81E8E2F2-0AF5-4302-9483-8FB2AC4A12E3}"/>
+                <a16:creationId xmlns:a16="http://schemas.microsoft.com/office/drawing/2014/main" xmlns="" id="{81E8E2F2-0AF5-4302-9483-8FB2AC4A12E3}"/>
               </a:ext>
             </a:extLst>
           </p:cNvPr>
@@ -2212,6 +2220,7 @@
           <a:p>
             <a:fld id="{A1FD0E78-183D-4F7D-A18B-8A4BED7B6988}" type="slidenum">
               <a:rPr lang="en-US" smtClean="0"/>
+              <a:pPr/>
               <a:t>‹#›</a:t>
             </a:fld>
             <a:endParaRPr lang="en-US"/>
@@ -2221,7 +2230,7 @@
     </p:spTree>
     <p:extLst>
       <p:ext uri="{BB962C8B-B14F-4D97-AF65-F5344CB8AC3E}">
-        <p14:creationId xmlns:p14="http://schemas.microsoft.com/office/powerpoint/2010/main" val="4191452652"/>
+        <p14:creationId xmlns:p14="http://schemas.microsoft.com/office/powerpoint/2010/main" xmlns="" val="4191452652"/>
       </p:ext>
     </p:extLst>
   </p:cSld>
@@ -2253,7 +2262,7 @@
           <p:cNvPr id="7" name="Rectangle 6">
             <a:extLst>
               <a:ext uri="{FF2B5EF4-FFF2-40B4-BE49-F238E27FC236}">
-                <a16:creationId xmlns:a16="http://schemas.microsoft.com/office/drawing/2014/main" id="{CD1C76EB-EFA3-4D98-BF85-9CBAD51246C3}"/>
+                <a16:creationId xmlns:a16="http://schemas.microsoft.com/office/drawing/2014/main" xmlns="" id="{CD1C76EB-EFA3-4D98-BF85-9CBAD51246C3}"/>
               </a:ext>
             </a:extLst>
           </p:cNvPr>
@@ -2305,7 +2314,7 @@
           <p:cNvPr id="8" name="Rectangle 7">
             <a:extLst>
               <a:ext uri="{FF2B5EF4-FFF2-40B4-BE49-F238E27FC236}">
-                <a16:creationId xmlns:a16="http://schemas.microsoft.com/office/drawing/2014/main" id="{70F9218A-B816-4B5F-A0BE-D0AAD688BCDE}"/>
+                <a16:creationId xmlns:a16="http://schemas.microsoft.com/office/drawing/2014/main" xmlns="" id="{70F9218A-B816-4B5F-A0BE-D0AAD688BCDE}"/>
               </a:ext>
             </a:extLst>
           </p:cNvPr>
@@ -2362,7 +2371,7 @@
           <p:cNvPr id="9" name="Picture 8">
             <a:extLst>
               <a:ext uri="{FF2B5EF4-FFF2-40B4-BE49-F238E27FC236}">
-                <a16:creationId xmlns:a16="http://schemas.microsoft.com/office/drawing/2014/main" id="{07792D18-2682-4285-9429-837643BCD1C7}"/>
+                <a16:creationId xmlns:a16="http://schemas.microsoft.com/office/drawing/2014/main" xmlns="" id="{07792D18-2682-4285-9429-837643BCD1C7}"/>
               </a:ext>
             </a:extLst>
           </p:cNvPr>
@@ -2372,11 +2381,11 @@
           <p:nvPr/>
         </p:nvPicPr>
         <p:blipFill>
-          <a:blip r:embed="rId2">
+          <a:blip r:embed="rId2" cstate="print">
             <a:biLevel thresh="25000"/>
             <a:extLst>
               <a:ext uri="{28A0092B-C50C-407E-A947-70E740481C1C}">
-                <a14:useLocalDpi xmlns:a14="http://schemas.microsoft.com/office/drawing/2010/main" val="0"/>
+                <a14:useLocalDpi xmlns:a14="http://schemas.microsoft.com/office/drawing/2010/main" xmlns="" val="0"/>
               </a:ext>
             </a:extLst>
           </a:blip>
@@ -2399,7 +2408,7 @@
           <p:cNvPr id="10" name="Rectangle 9">
             <a:extLst>
               <a:ext uri="{FF2B5EF4-FFF2-40B4-BE49-F238E27FC236}">
-                <a16:creationId xmlns:a16="http://schemas.microsoft.com/office/drawing/2014/main" id="{31E5457F-D05E-4FBC-AA16-B4542B833804}"/>
+                <a16:creationId xmlns:a16="http://schemas.microsoft.com/office/drawing/2014/main" xmlns="" id="{31E5457F-D05E-4FBC-AA16-B4542B833804}"/>
               </a:ext>
             </a:extLst>
           </p:cNvPr>
@@ -2461,7 +2470,7 @@
           <p:cNvPr id="11" name="Rectangle 10">
             <a:extLst>
               <a:ext uri="{FF2B5EF4-FFF2-40B4-BE49-F238E27FC236}">
-                <a16:creationId xmlns:a16="http://schemas.microsoft.com/office/drawing/2014/main" id="{3D20450F-F92F-43A7-B557-0485260B48EC}"/>
+                <a16:creationId xmlns:a16="http://schemas.microsoft.com/office/drawing/2014/main" xmlns="" id="{3D20450F-F92F-43A7-B557-0485260B48EC}"/>
               </a:ext>
             </a:extLst>
           </p:cNvPr>
@@ -2523,7 +2532,7 @@
           <p:cNvPr id="12" name="Rectangle 11">
             <a:extLst>
               <a:ext uri="{FF2B5EF4-FFF2-40B4-BE49-F238E27FC236}">
-                <a16:creationId xmlns:a16="http://schemas.microsoft.com/office/drawing/2014/main" id="{20D495CD-0755-4CD0-952C-38FDFD818912}"/>
+                <a16:creationId xmlns:a16="http://schemas.microsoft.com/office/drawing/2014/main" xmlns="" id="{20D495CD-0755-4CD0-952C-38FDFD818912}"/>
               </a:ext>
             </a:extLst>
           </p:cNvPr>
@@ -2585,7 +2594,7 @@
           <p:cNvPr id="13" name="Rectangle 12">
             <a:extLst>
               <a:ext uri="{FF2B5EF4-FFF2-40B4-BE49-F238E27FC236}">
-                <a16:creationId xmlns:a16="http://schemas.microsoft.com/office/drawing/2014/main" id="{F756530E-6471-4A98-9409-D28702635498}"/>
+                <a16:creationId xmlns:a16="http://schemas.microsoft.com/office/drawing/2014/main" xmlns="" id="{F756530E-6471-4A98-9409-D28702635498}"/>
               </a:ext>
             </a:extLst>
           </p:cNvPr>
@@ -2647,7 +2656,7 @@
           <p:cNvPr id="2" name="Title 1">
             <a:extLst>
               <a:ext uri="{FF2B5EF4-FFF2-40B4-BE49-F238E27FC236}">
-                <a16:creationId xmlns:a16="http://schemas.microsoft.com/office/drawing/2014/main" id="{54E16744-0EC5-4409-8030-9D707EE1A1D6}"/>
+                <a16:creationId xmlns:a16="http://schemas.microsoft.com/office/drawing/2014/main" xmlns="" id="{54E16744-0EC5-4409-8030-9D707EE1A1D6}"/>
               </a:ext>
             </a:extLst>
           </p:cNvPr>
@@ -2692,7 +2701,7 @@
           <p:cNvPr id="3" name="Text Placeholder 2">
             <a:extLst>
               <a:ext uri="{FF2B5EF4-FFF2-40B4-BE49-F238E27FC236}">
-                <a16:creationId xmlns:a16="http://schemas.microsoft.com/office/drawing/2014/main" id="{C98CF225-F19A-40FE-9134-ADAC53A2CB8E}"/>
+                <a16:creationId xmlns:a16="http://schemas.microsoft.com/office/drawing/2014/main" xmlns="" id="{C98CF225-F19A-40FE-9134-ADAC53A2CB8E}"/>
               </a:ext>
             </a:extLst>
           </p:cNvPr>
@@ -2818,7 +2827,7 @@
           <p:cNvPr id="4" name="Date Placeholder 3">
             <a:extLst>
               <a:ext uri="{FF2B5EF4-FFF2-40B4-BE49-F238E27FC236}">
-                <a16:creationId xmlns:a16="http://schemas.microsoft.com/office/drawing/2014/main" id="{E6052890-A463-40F0-8781-AB9ECF34701B}"/>
+                <a16:creationId xmlns:a16="http://schemas.microsoft.com/office/drawing/2014/main" xmlns="" id="{E6052890-A463-40F0-8781-AB9ECF34701B}"/>
               </a:ext>
             </a:extLst>
           </p:cNvPr>
@@ -2836,7 +2845,8 @@
           <a:p>
             <a:fld id="{D2474CCF-98B4-411A-8810-C31E8C29E19B}" type="datetimeFigureOut">
               <a:rPr lang="en-US" smtClean="0"/>
-              <a:t>6/11/2022</a:t>
+              <a:pPr/>
+              <a:t>7/6/2023</a:t>
             </a:fld>
             <a:endParaRPr lang="en-US"/>
           </a:p>
@@ -2847,7 +2857,7 @@
           <p:cNvPr id="5" name="Footer Placeholder 4">
             <a:extLst>
               <a:ext uri="{FF2B5EF4-FFF2-40B4-BE49-F238E27FC236}">
-                <a16:creationId xmlns:a16="http://schemas.microsoft.com/office/drawing/2014/main" id="{4B4EBFC2-28E7-4B50-9949-2BDA85E26BB6}"/>
+                <a16:creationId xmlns:a16="http://schemas.microsoft.com/office/drawing/2014/main" xmlns="" id="{4B4EBFC2-28E7-4B50-9949-2BDA85E26BB6}"/>
               </a:ext>
             </a:extLst>
           </p:cNvPr>
@@ -2872,7 +2882,7 @@
           <p:cNvPr id="6" name="Slide Number Placeholder 5">
             <a:extLst>
               <a:ext uri="{FF2B5EF4-FFF2-40B4-BE49-F238E27FC236}">
-                <a16:creationId xmlns:a16="http://schemas.microsoft.com/office/drawing/2014/main" id="{90C98516-7864-4AE1-84EA-04757DF14368}"/>
+                <a16:creationId xmlns:a16="http://schemas.microsoft.com/office/drawing/2014/main" xmlns="" id="{90C98516-7864-4AE1-84EA-04757DF14368}"/>
               </a:ext>
             </a:extLst>
           </p:cNvPr>
@@ -2890,6 +2900,7 @@
           <a:p>
             <a:fld id="{A1FD0E78-183D-4F7D-A18B-8A4BED7B6988}" type="slidenum">
               <a:rPr lang="en-US" smtClean="0"/>
+              <a:pPr/>
               <a:t>‹#›</a:t>
             </a:fld>
             <a:endParaRPr lang="en-US"/>
@@ -2901,7 +2912,7 @@
           <p:cNvPr id="14" name="Straight Connector 13">
             <a:extLst>
               <a:ext uri="{FF2B5EF4-FFF2-40B4-BE49-F238E27FC236}">
-                <a16:creationId xmlns:a16="http://schemas.microsoft.com/office/drawing/2014/main" id="{709AA055-0DD5-4F16-B6C2-4900CC928098}"/>
+                <a16:creationId xmlns:a16="http://schemas.microsoft.com/office/drawing/2014/main" xmlns="" id="{709AA055-0DD5-4F16-B6C2-4900CC928098}"/>
               </a:ext>
             </a:extLst>
           </p:cNvPr>
@@ -2935,7 +2946,7 @@
     </p:spTree>
     <p:extLst>
       <p:ext uri="{BB962C8B-B14F-4D97-AF65-F5344CB8AC3E}">
-        <p14:creationId xmlns:p14="http://schemas.microsoft.com/office/powerpoint/2010/main" val="3753181276"/>
+        <p14:creationId xmlns:p14="http://schemas.microsoft.com/office/powerpoint/2010/main" xmlns="" val="3753181276"/>
       </p:ext>
     </p:extLst>
   </p:cSld>
@@ -2967,7 +2978,7 @@
           <p:cNvPr id="8" name="Rectangle 7">
             <a:extLst>
               <a:ext uri="{FF2B5EF4-FFF2-40B4-BE49-F238E27FC236}">
-                <a16:creationId xmlns:a16="http://schemas.microsoft.com/office/drawing/2014/main" id="{428ED813-B8D0-48D3-B71C-48DF5BDC9A90}"/>
+                <a16:creationId xmlns:a16="http://schemas.microsoft.com/office/drawing/2014/main" xmlns="" id="{428ED813-B8D0-48D3-B71C-48DF5BDC9A90}"/>
               </a:ext>
             </a:extLst>
           </p:cNvPr>
@@ -3016,7 +3027,7 @@
           <p:cNvPr id="9" name="Rectangle 8">
             <a:extLst>
               <a:ext uri="{FF2B5EF4-FFF2-40B4-BE49-F238E27FC236}">
-                <a16:creationId xmlns:a16="http://schemas.microsoft.com/office/drawing/2014/main" id="{FDF0879C-37D2-4E04-A609-4FEBD2EB69A2}"/>
+                <a16:creationId xmlns:a16="http://schemas.microsoft.com/office/drawing/2014/main" xmlns="" id="{FDF0879C-37D2-4E04-A609-4FEBD2EB69A2}"/>
               </a:ext>
             </a:extLst>
           </p:cNvPr>
@@ -3073,7 +3084,7 @@
           <p:cNvPr id="10" name="Rectangle 9">
             <a:extLst>
               <a:ext uri="{FF2B5EF4-FFF2-40B4-BE49-F238E27FC236}">
-                <a16:creationId xmlns:a16="http://schemas.microsoft.com/office/drawing/2014/main" id="{94C859E1-EF9A-419B-B3AC-AEA4B510D174}"/>
+                <a16:creationId xmlns:a16="http://schemas.microsoft.com/office/drawing/2014/main" xmlns="" id="{94C859E1-EF9A-419B-B3AC-AEA4B510D174}"/>
               </a:ext>
             </a:extLst>
           </p:cNvPr>
@@ -3135,7 +3146,7 @@
           <p:cNvPr id="11" name="Rectangle 10">
             <a:extLst>
               <a:ext uri="{FF2B5EF4-FFF2-40B4-BE49-F238E27FC236}">
-                <a16:creationId xmlns:a16="http://schemas.microsoft.com/office/drawing/2014/main" id="{D14C3DBE-5B2C-4C2D-8079-CF803A046CD5}"/>
+                <a16:creationId xmlns:a16="http://schemas.microsoft.com/office/drawing/2014/main" xmlns="" id="{D14C3DBE-5B2C-4C2D-8079-CF803A046CD5}"/>
               </a:ext>
             </a:extLst>
           </p:cNvPr>
@@ -3197,7 +3208,7 @@
           <p:cNvPr id="12" name="Rectangle 11">
             <a:extLst>
               <a:ext uri="{FF2B5EF4-FFF2-40B4-BE49-F238E27FC236}">
-                <a16:creationId xmlns:a16="http://schemas.microsoft.com/office/drawing/2014/main" id="{ECE1258E-5E7B-49D9-AB2A-3FCE6F2AE3D9}"/>
+                <a16:creationId xmlns:a16="http://schemas.microsoft.com/office/drawing/2014/main" xmlns="" id="{ECE1258E-5E7B-49D9-AB2A-3FCE6F2AE3D9}"/>
               </a:ext>
             </a:extLst>
           </p:cNvPr>
@@ -3259,7 +3270,7 @@
           <p:cNvPr id="13" name="Rectangle 12">
             <a:extLst>
               <a:ext uri="{FF2B5EF4-FFF2-40B4-BE49-F238E27FC236}">
-                <a16:creationId xmlns:a16="http://schemas.microsoft.com/office/drawing/2014/main" id="{EF2A0B40-AB4B-42CA-AD19-364DF8432A34}"/>
+                <a16:creationId xmlns:a16="http://schemas.microsoft.com/office/drawing/2014/main" xmlns="" id="{EF2A0B40-AB4B-42CA-AD19-364DF8432A34}"/>
               </a:ext>
             </a:extLst>
           </p:cNvPr>
@@ -3321,7 +3332,7 @@
           <p:cNvPr id="14" name="Picture 13">
             <a:extLst>
               <a:ext uri="{FF2B5EF4-FFF2-40B4-BE49-F238E27FC236}">
-                <a16:creationId xmlns:a16="http://schemas.microsoft.com/office/drawing/2014/main" id="{5ACF1E32-F9E6-49E7-B655-4856AC619B36}"/>
+                <a16:creationId xmlns:a16="http://schemas.microsoft.com/office/drawing/2014/main" xmlns="" id="{5ACF1E32-F9E6-49E7-B655-4856AC619B36}"/>
               </a:ext>
             </a:extLst>
           </p:cNvPr>
@@ -3331,10 +3342,10 @@
           <p:nvPr/>
         </p:nvPicPr>
         <p:blipFill>
-          <a:blip r:embed="rId2">
+          <a:blip r:embed="rId2" cstate="print">
             <a:extLst>
               <a:ext uri="{28A0092B-C50C-407E-A947-70E740481C1C}">
-                <a14:useLocalDpi xmlns:a14="http://schemas.microsoft.com/office/drawing/2010/main" val="0"/>
+                <a14:useLocalDpi xmlns:a14="http://schemas.microsoft.com/office/drawing/2010/main" xmlns="" val="0"/>
               </a:ext>
             </a:extLst>
           </a:blip>
@@ -3357,7 +3368,7 @@
           <p:cNvPr id="2" name="Title 1">
             <a:extLst>
               <a:ext uri="{FF2B5EF4-FFF2-40B4-BE49-F238E27FC236}">
-                <a16:creationId xmlns:a16="http://schemas.microsoft.com/office/drawing/2014/main" id="{F3355067-D68C-4E9D-814B-94F341ACA832}"/>
+                <a16:creationId xmlns:a16="http://schemas.microsoft.com/office/drawing/2014/main" xmlns="" id="{F3355067-D68C-4E9D-814B-94F341ACA832}"/>
               </a:ext>
             </a:extLst>
           </p:cNvPr>
@@ -3385,7 +3396,7 @@
           <p:cNvPr id="3" name="Content Placeholder 2">
             <a:extLst>
               <a:ext uri="{FF2B5EF4-FFF2-40B4-BE49-F238E27FC236}">
-                <a16:creationId xmlns:a16="http://schemas.microsoft.com/office/drawing/2014/main" id="{E7E56A77-566F-415D-85B3-C170D979EF12}"/>
+                <a16:creationId xmlns:a16="http://schemas.microsoft.com/office/drawing/2014/main" xmlns="" id="{E7E56A77-566F-415D-85B3-C170D979EF12}"/>
               </a:ext>
             </a:extLst>
           </p:cNvPr>
@@ -3447,7 +3458,7 @@
           <p:cNvPr id="4" name="Content Placeholder 3">
             <a:extLst>
               <a:ext uri="{FF2B5EF4-FFF2-40B4-BE49-F238E27FC236}">
-                <a16:creationId xmlns:a16="http://schemas.microsoft.com/office/drawing/2014/main" id="{B022F81A-5D76-4DBF-9DF9-92CD90E7067D}"/>
+                <a16:creationId xmlns:a16="http://schemas.microsoft.com/office/drawing/2014/main" xmlns="" id="{B022F81A-5D76-4DBF-9DF9-92CD90E7067D}"/>
               </a:ext>
             </a:extLst>
           </p:cNvPr>
@@ -3509,7 +3520,7 @@
           <p:cNvPr id="5" name="Date Placeholder 4">
             <a:extLst>
               <a:ext uri="{FF2B5EF4-FFF2-40B4-BE49-F238E27FC236}">
-                <a16:creationId xmlns:a16="http://schemas.microsoft.com/office/drawing/2014/main" id="{F71F8005-F81C-45EB-B6F5-872E765EC87A}"/>
+                <a16:creationId xmlns:a16="http://schemas.microsoft.com/office/drawing/2014/main" xmlns="" id="{F71F8005-F81C-45EB-B6F5-872E765EC87A}"/>
               </a:ext>
             </a:extLst>
           </p:cNvPr>
@@ -3527,7 +3538,8 @@
           <a:p>
             <a:fld id="{D2474CCF-98B4-411A-8810-C31E8C29E19B}" type="datetimeFigureOut">
               <a:rPr lang="en-US" smtClean="0"/>
-              <a:t>6/11/2022</a:t>
+              <a:pPr/>
+              <a:t>7/6/2023</a:t>
             </a:fld>
             <a:endParaRPr lang="en-US"/>
           </a:p>
@@ -3538,7 +3550,7 @@
           <p:cNvPr id="6" name="Footer Placeholder 5">
             <a:extLst>
               <a:ext uri="{FF2B5EF4-FFF2-40B4-BE49-F238E27FC236}">
-                <a16:creationId xmlns:a16="http://schemas.microsoft.com/office/drawing/2014/main" id="{2062E53F-F0E3-4A6E-B3B1-F5491F54889A}"/>
+                <a16:creationId xmlns:a16="http://schemas.microsoft.com/office/drawing/2014/main" xmlns="" id="{2062E53F-F0E3-4A6E-B3B1-F5491F54889A}"/>
               </a:ext>
             </a:extLst>
           </p:cNvPr>
@@ -3563,7 +3575,7 @@
           <p:cNvPr id="7" name="Slide Number Placeholder 6">
             <a:extLst>
               <a:ext uri="{FF2B5EF4-FFF2-40B4-BE49-F238E27FC236}">
-                <a16:creationId xmlns:a16="http://schemas.microsoft.com/office/drawing/2014/main" id="{A8B69BF3-2B4A-42F7-B934-99F11627F82D}"/>
+                <a16:creationId xmlns:a16="http://schemas.microsoft.com/office/drawing/2014/main" xmlns="" id="{A8B69BF3-2B4A-42F7-B934-99F11627F82D}"/>
               </a:ext>
             </a:extLst>
           </p:cNvPr>
@@ -3581,6 +3593,7 @@
           <a:p>
             <a:fld id="{A1FD0E78-183D-4F7D-A18B-8A4BED7B6988}" type="slidenum">
               <a:rPr lang="en-US" smtClean="0"/>
+              <a:pPr/>
               <a:t>‹#›</a:t>
             </a:fld>
             <a:endParaRPr lang="en-US"/>
@@ -3590,7 +3603,7 @@
     </p:spTree>
     <p:extLst>
       <p:ext uri="{BB962C8B-B14F-4D97-AF65-F5344CB8AC3E}">
-        <p14:creationId xmlns:p14="http://schemas.microsoft.com/office/powerpoint/2010/main" val="2838539625"/>
+        <p14:creationId xmlns:p14="http://schemas.microsoft.com/office/powerpoint/2010/main" xmlns="" val="2838539625"/>
       </p:ext>
     </p:extLst>
   </p:cSld>
@@ -3622,7 +3635,7 @@
           <p:cNvPr id="10" name="Rectangle 9">
             <a:extLst>
               <a:ext uri="{FF2B5EF4-FFF2-40B4-BE49-F238E27FC236}">
-                <a16:creationId xmlns:a16="http://schemas.microsoft.com/office/drawing/2014/main" id="{5894546B-A81A-48D4-B4C5-7E2E6285F424}"/>
+                <a16:creationId xmlns:a16="http://schemas.microsoft.com/office/drawing/2014/main" xmlns="" id="{5894546B-A81A-48D4-B4C5-7E2E6285F424}"/>
               </a:ext>
             </a:extLst>
           </p:cNvPr>
@@ -3671,7 +3684,7 @@
           <p:cNvPr id="11" name="Rectangle 10">
             <a:extLst>
               <a:ext uri="{FF2B5EF4-FFF2-40B4-BE49-F238E27FC236}">
-                <a16:creationId xmlns:a16="http://schemas.microsoft.com/office/drawing/2014/main" id="{39C06CAA-5E4F-43E2-8A98-36361486A3A4}"/>
+                <a16:creationId xmlns:a16="http://schemas.microsoft.com/office/drawing/2014/main" xmlns="" id="{39C06CAA-5E4F-43E2-8A98-36361486A3A4}"/>
               </a:ext>
             </a:extLst>
           </p:cNvPr>
@@ -3728,7 +3741,7 @@
           <p:cNvPr id="12" name="Rectangle 11">
             <a:extLst>
               <a:ext uri="{FF2B5EF4-FFF2-40B4-BE49-F238E27FC236}">
-                <a16:creationId xmlns:a16="http://schemas.microsoft.com/office/drawing/2014/main" id="{128E28CB-622A-4807-91B6-87A76E180121}"/>
+                <a16:creationId xmlns:a16="http://schemas.microsoft.com/office/drawing/2014/main" xmlns="" id="{128E28CB-622A-4807-91B6-87A76E180121}"/>
               </a:ext>
             </a:extLst>
           </p:cNvPr>
@@ -3790,7 +3803,7 @@
           <p:cNvPr id="13" name="Rectangle 12">
             <a:extLst>
               <a:ext uri="{FF2B5EF4-FFF2-40B4-BE49-F238E27FC236}">
-                <a16:creationId xmlns:a16="http://schemas.microsoft.com/office/drawing/2014/main" id="{9C30D63E-AE12-491E-81E4-B3C25BA710AC}"/>
+                <a16:creationId xmlns:a16="http://schemas.microsoft.com/office/drawing/2014/main" xmlns="" id="{9C30D63E-AE12-491E-81E4-B3C25BA710AC}"/>
               </a:ext>
             </a:extLst>
           </p:cNvPr>
@@ -3852,7 +3865,7 @@
           <p:cNvPr id="14" name="Rectangle 13">
             <a:extLst>
               <a:ext uri="{FF2B5EF4-FFF2-40B4-BE49-F238E27FC236}">
-                <a16:creationId xmlns:a16="http://schemas.microsoft.com/office/drawing/2014/main" id="{BEA4929A-0E7F-4B2B-81BC-6899210E604F}"/>
+                <a16:creationId xmlns:a16="http://schemas.microsoft.com/office/drawing/2014/main" xmlns="" id="{BEA4929A-0E7F-4B2B-81BC-6899210E604F}"/>
               </a:ext>
             </a:extLst>
           </p:cNvPr>
@@ -3914,7 +3927,7 @@
           <p:cNvPr id="15" name="Rectangle 14">
             <a:extLst>
               <a:ext uri="{FF2B5EF4-FFF2-40B4-BE49-F238E27FC236}">
-                <a16:creationId xmlns:a16="http://schemas.microsoft.com/office/drawing/2014/main" id="{4C27A026-FFDC-4CB9-9AB8-BB4B31660FD8}"/>
+                <a16:creationId xmlns:a16="http://schemas.microsoft.com/office/drawing/2014/main" xmlns="" id="{4C27A026-FFDC-4CB9-9AB8-BB4B31660FD8}"/>
               </a:ext>
             </a:extLst>
           </p:cNvPr>
@@ -3976,7 +3989,7 @@
           <p:cNvPr id="16" name="Picture 15">
             <a:extLst>
               <a:ext uri="{FF2B5EF4-FFF2-40B4-BE49-F238E27FC236}">
-                <a16:creationId xmlns:a16="http://schemas.microsoft.com/office/drawing/2014/main" id="{CE0FBF31-43A4-4034-8688-BF6697211B67}"/>
+                <a16:creationId xmlns:a16="http://schemas.microsoft.com/office/drawing/2014/main" xmlns="" id="{CE0FBF31-43A4-4034-8688-BF6697211B67}"/>
               </a:ext>
             </a:extLst>
           </p:cNvPr>
@@ -3986,10 +3999,10 @@
           <p:nvPr/>
         </p:nvPicPr>
         <p:blipFill>
-          <a:blip r:embed="rId2">
+          <a:blip r:embed="rId2" cstate="print">
             <a:extLst>
               <a:ext uri="{28A0092B-C50C-407E-A947-70E740481C1C}">
-                <a14:useLocalDpi xmlns:a14="http://schemas.microsoft.com/office/drawing/2010/main" val="0"/>
+                <a14:useLocalDpi xmlns:a14="http://schemas.microsoft.com/office/drawing/2010/main" xmlns="" val="0"/>
               </a:ext>
             </a:extLst>
           </a:blip>
@@ -4012,7 +4025,7 @@
           <p:cNvPr id="2" name="Title 1">
             <a:extLst>
               <a:ext uri="{FF2B5EF4-FFF2-40B4-BE49-F238E27FC236}">
-                <a16:creationId xmlns:a16="http://schemas.microsoft.com/office/drawing/2014/main" id="{FA67B1EE-D3B9-4A72-BB78-BEAFBE1FD62F}"/>
+                <a16:creationId xmlns:a16="http://schemas.microsoft.com/office/drawing/2014/main" xmlns="" id="{FA67B1EE-D3B9-4A72-BB78-BEAFBE1FD62F}"/>
               </a:ext>
             </a:extLst>
           </p:cNvPr>
@@ -4045,7 +4058,7 @@
           <p:cNvPr id="3" name="Text Placeholder 2">
             <a:extLst>
               <a:ext uri="{FF2B5EF4-FFF2-40B4-BE49-F238E27FC236}">
-                <a16:creationId xmlns:a16="http://schemas.microsoft.com/office/drawing/2014/main" id="{53C1261F-F460-4F19-99F4-F65B97B6FB44}"/>
+                <a16:creationId xmlns:a16="http://schemas.microsoft.com/office/drawing/2014/main" xmlns="" id="{53C1261F-F460-4F19-99F4-F65B97B6FB44}"/>
               </a:ext>
             </a:extLst>
           </p:cNvPr>
@@ -4116,7 +4129,7 @@
           <p:cNvPr id="4" name="Content Placeholder 3">
             <a:extLst>
               <a:ext uri="{FF2B5EF4-FFF2-40B4-BE49-F238E27FC236}">
-                <a16:creationId xmlns:a16="http://schemas.microsoft.com/office/drawing/2014/main" id="{D0C84E1E-AD39-414E-A630-BB5F20BC8A9B}"/>
+                <a16:creationId xmlns:a16="http://schemas.microsoft.com/office/drawing/2014/main" xmlns="" id="{D0C84E1E-AD39-414E-A630-BB5F20BC8A9B}"/>
               </a:ext>
             </a:extLst>
           </p:cNvPr>
@@ -4178,7 +4191,7 @@
           <p:cNvPr id="5" name="Text Placeholder 4">
             <a:extLst>
               <a:ext uri="{FF2B5EF4-FFF2-40B4-BE49-F238E27FC236}">
-                <a16:creationId xmlns:a16="http://schemas.microsoft.com/office/drawing/2014/main" id="{9EEA01E5-2430-4A1C-8323-5D191529BD67}"/>
+                <a16:creationId xmlns:a16="http://schemas.microsoft.com/office/drawing/2014/main" xmlns="" id="{9EEA01E5-2430-4A1C-8323-5D191529BD67}"/>
               </a:ext>
             </a:extLst>
           </p:cNvPr>
@@ -4249,7 +4262,7 @@
           <p:cNvPr id="6" name="Content Placeholder 5">
             <a:extLst>
               <a:ext uri="{FF2B5EF4-FFF2-40B4-BE49-F238E27FC236}">
-                <a16:creationId xmlns:a16="http://schemas.microsoft.com/office/drawing/2014/main" id="{B4C4A9DA-01AC-4343-9532-A824358CD679}"/>
+                <a16:creationId xmlns:a16="http://schemas.microsoft.com/office/drawing/2014/main" xmlns="" id="{B4C4A9DA-01AC-4343-9532-A824358CD679}"/>
               </a:ext>
             </a:extLst>
           </p:cNvPr>
@@ -4311,7 +4324,7 @@
           <p:cNvPr id="7" name="Date Placeholder 6">
             <a:extLst>
               <a:ext uri="{FF2B5EF4-FFF2-40B4-BE49-F238E27FC236}">
-                <a16:creationId xmlns:a16="http://schemas.microsoft.com/office/drawing/2014/main" id="{CA9BA755-AEE2-4001-8DE6-415A8DBF9673}"/>
+                <a16:creationId xmlns:a16="http://schemas.microsoft.com/office/drawing/2014/main" xmlns="" id="{CA9BA755-AEE2-4001-8DE6-415A8DBF9673}"/>
               </a:ext>
             </a:extLst>
           </p:cNvPr>
@@ -4329,7 +4342,8 @@
           <a:p>
             <a:fld id="{D2474CCF-98B4-411A-8810-C31E8C29E19B}" type="datetimeFigureOut">
               <a:rPr lang="en-US" smtClean="0"/>
-              <a:t>6/11/2022</a:t>
+              <a:pPr/>
+              <a:t>7/6/2023</a:t>
             </a:fld>
             <a:endParaRPr lang="en-US"/>
           </a:p>
@@ -4340,7 +4354,7 @@
           <p:cNvPr id="8" name="Footer Placeholder 7">
             <a:extLst>
               <a:ext uri="{FF2B5EF4-FFF2-40B4-BE49-F238E27FC236}">
-                <a16:creationId xmlns:a16="http://schemas.microsoft.com/office/drawing/2014/main" id="{823B665F-223D-495A-BDBB-E3363CAFC9D8}"/>
+                <a16:creationId xmlns:a16="http://schemas.microsoft.com/office/drawing/2014/main" xmlns="" id="{823B665F-223D-495A-BDBB-E3363CAFC9D8}"/>
               </a:ext>
             </a:extLst>
           </p:cNvPr>
@@ -4365,7 +4379,7 @@
           <p:cNvPr id="9" name="Slide Number Placeholder 8">
             <a:extLst>
               <a:ext uri="{FF2B5EF4-FFF2-40B4-BE49-F238E27FC236}">
-                <a16:creationId xmlns:a16="http://schemas.microsoft.com/office/drawing/2014/main" id="{B19B297C-3F38-49A1-953B-17E3F6F667AE}"/>
+                <a16:creationId xmlns:a16="http://schemas.microsoft.com/office/drawing/2014/main" xmlns="" id="{B19B297C-3F38-49A1-953B-17E3F6F667AE}"/>
               </a:ext>
             </a:extLst>
           </p:cNvPr>
@@ -4383,6 +4397,7 @@
           <a:p>
             <a:fld id="{A1FD0E78-183D-4F7D-A18B-8A4BED7B6988}" type="slidenum">
               <a:rPr lang="en-US" smtClean="0"/>
+              <a:pPr/>
               <a:t>‹#›</a:t>
             </a:fld>
             <a:endParaRPr lang="en-US"/>
@@ -4392,7 +4407,7 @@
     </p:spTree>
     <p:extLst>
       <p:ext uri="{BB962C8B-B14F-4D97-AF65-F5344CB8AC3E}">
-        <p14:creationId xmlns:p14="http://schemas.microsoft.com/office/powerpoint/2010/main" val="265057621"/>
+        <p14:creationId xmlns:p14="http://schemas.microsoft.com/office/powerpoint/2010/main" xmlns="" val="265057621"/>
       </p:ext>
     </p:extLst>
   </p:cSld>
@@ -4424,7 +4439,7 @@
           <p:cNvPr id="6" name="Rectangle 5">
             <a:extLst>
               <a:ext uri="{FF2B5EF4-FFF2-40B4-BE49-F238E27FC236}">
-                <a16:creationId xmlns:a16="http://schemas.microsoft.com/office/drawing/2014/main" id="{37856098-1DA3-49E8-91B8-CAA5CDB7382E}"/>
+                <a16:creationId xmlns:a16="http://schemas.microsoft.com/office/drawing/2014/main" xmlns="" id="{37856098-1DA3-49E8-91B8-CAA5CDB7382E}"/>
               </a:ext>
             </a:extLst>
           </p:cNvPr>
@@ -4473,7 +4488,7 @@
           <p:cNvPr id="7" name="Rectangle 6">
             <a:extLst>
               <a:ext uri="{FF2B5EF4-FFF2-40B4-BE49-F238E27FC236}">
-                <a16:creationId xmlns:a16="http://schemas.microsoft.com/office/drawing/2014/main" id="{8AD2C0DA-73C9-4A83-97A2-EB4541745B64}"/>
+                <a16:creationId xmlns:a16="http://schemas.microsoft.com/office/drawing/2014/main" xmlns="" id="{8AD2C0DA-73C9-4A83-97A2-EB4541745B64}"/>
               </a:ext>
             </a:extLst>
           </p:cNvPr>
@@ -4530,7 +4545,7 @@
           <p:cNvPr id="8" name="Rectangle 7">
             <a:extLst>
               <a:ext uri="{FF2B5EF4-FFF2-40B4-BE49-F238E27FC236}">
-                <a16:creationId xmlns:a16="http://schemas.microsoft.com/office/drawing/2014/main" id="{B83A0938-3C8A-4ACA-8AD0-352B444392A9}"/>
+                <a16:creationId xmlns:a16="http://schemas.microsoft.com/office/drawing/2014/main" xmlns="" id="{B83A0938-3C8A-4ACA-8AD0-352B444392A9}"/>
               </a:ext>
             </a:extLst>
           </p:cNvPr>
@@ -4592,7 +4607,7 @@
           <p:cNvPr id="9" name="Rectangle 8">
             <a:extLst>
               <a:ext uri="{FF2B5EF4-FFF2-40B4-BE49-F238E27FC236}">
-                <a16:creationId xmlns:a16="http://schemas.microsoft.com/office/drawing/2014/main" id="{2FE9A254-00DC-4FF4-ABF3-8D548470A822}"/>
+                <a16:creationId xmlns:a16="http://schemas.microsoft.com/office/drawing/2014/main" xmlns="" id="{2FE9A254-00DC-4FF4-ABF3-8D548470A822}"/>
               </a:ext>
             </a:extLst>
           </p:cNvPr>
@@ -4654,7 +4669,7 @@
           <p:cNvPr id="10" name="Rectangle 9">
             <a:extLst>
               <a:ext uri="{FF2B5EF4-FFF2-40B4-BE49-F238E27FC236}">
-                <a16:creationId xmlns:a16="http://schemas.microsoft.com/office/drawing/2014/main" id="{27E83A17-368C-4CF3-93EE-956780C13754}"/>
+                <a16:creationId xmlns:a16="http://schemas.microsoft.com/office/drawing/2014/main" xmlns="" id="{27E83A17-368C-4CF3-93EE-956780C13754}"/>
               </a:ext>
             </a:extLst>
           </p:cNvPr>
@@ -4716,7 +4731,7 @@
           <p:cNvPr id="11" name="Rectangle 10">
             <a:extLst>
               <a:ext uri="{FF2B5EF4-FFF2-40B4-BE49-F238E27FC236}">
-                <a16:creationId xmlns:a16="http://schemas.microsoft.com/office/drawing/2014/main" id="{F86DDFCB-6B13-4853-B2B2-7FDD576847E1}"/>
+                <a16:creationId xmlns:a16="http://schemas.microsoft.com/office/drawing/2014/main" xmlns="" id="{F86DDFCB-6B13-4853-B2B2-7FDD576847E1}"/>
               </a:ext>
             </a:extLst>
           </p:cNvPr>
@@ -4778,7 +4793,7 @@
           <p:cNvPr id="12" name="Picture 11">
             <a:extLst>
               <a:ext uri="{FF2B5EF4-FFF2-40B4-BE49-F238E27FC236}">
-                <a16:creationId xmlns:a16="http://schemas.microsoft.com/office/drawing/2014/main" id="{64C8E1E0-E974-41E1-9F43-DEF84D8A1F22}"/>
+                <a16:creationId xmlns:a16="http://schemas.microsoft.com/office/drawing/2014/main" xmlns="" id="{64C8E1E0-E974-41E1-9F43-DEF84D8A1F22}"/>
               </a:ext>
             </a:extLst>
           </p:cNvPr>
@@ -4788,10 +4803,10 @@
           <p:nvPr/>
         </p:nvPicPr>
         <p:blipFill>
-          <a:blip r:embed="rId2">
+          <a:blip r:embed="rId2" cstate="print">
             <a:extLst>
               <a:ext uri="{28A0092B-C50C-407E-A947-70E740481C1C}">
-                <a14:useLocalDpi xmlns:a14="http://schemas.microsoft.com/office/drawing/2010/main" val="0"/>
+                <a14:useLocalDpi xmlns:a14="http://schemas.microsoft.com/office/drawing/2010/main" xmlns="" val="0"/>
               </a:ext>
             </a:extLst>
           </a:blip>
@@ -4814,7 +4829,7 @@
           <p:cNvPr id="2" name="Title 1">
             <a:extLst>
               <a:ext uri="{FF2B5EF4-FFF2-40B4-BE49-F238E27FC236}">
-                <a16:creationId xmlns:a16="http://schemas.microsoft.com/office/drawing/2014/main" id="{634473C1-75AC-4CC3-97E1-56E2CDDB9EEA}"/>
+                <a16:creationId xmlns:a16="http://schemas.microsoft.com/office/drawing/2014/main" xmlns="" id="{634473C1-75AC-4CC3-97E1-56E2CDDB9EEA}"/>
               </a:ext>
             </a:extLst>
           </p:cNvPr>
@@ -4842,7 +4857,7 @@
           <p:cNvPr id="3" name="Date Placeholder 2">
             <a:extLst>
               <a:ext uri="{FF2B5EF4-FFF2-40B4-BE49-F238E27FC236}">
-                <a16:creationId xmlns:a16="http://schemas.microsoft.com/office/drawing/2014/main" id="{8027F37E-14E1-44B3-BCD8-AEBD153A14BA}"/>
+                <a16:creationId xmlns:a16="http://schemas.microsoft.com/office/drawing/2014/main" xmlns="" id="{8027F37E-14E1-44B3-BCD8-AEBD153A14BA}"/>
               </a:ext>
             </a:extLst>
           </p:cNvPr>
@@ -4860,7 +4875,8 @@
           <a:p>
             <a:fld id="{D2474CCF-98B4-411A-8810-C31E8C29E19B}" type="datetimeFigureOut">
               <a:rPr lang="en-US" smtClean="0"/>
-              <a:t>6/11/2022</a:t>
+              <a:pPr/>
+              <a:t>7/6/2023</a:t>
             </a:fld>
             <a:endParaRPr lang="en-US"/>
           </a:p>
@@ -4871,7 +4887,7 @@
           <p:cNvPr id="4" name="Footer Placeholder 3">
             <a:extLst>
               <a:ext uri="{FF2B5EF4-FFF2-40B4-BE49-F238E27FC236}">
-                <a16:creationId xmlns:a16="http://schemas.microsoft.com/office/drawing/2014/main" id="{3EEB09FB-ACF3-4E2F-B66D-3E13733A5B2B}"/>
+                <a16:creationId xmlns:a16="http://schemas.microsoft.com/office/drawing/2014/main" xmlns="" id="{3EEB09FB-ACF3-4E2F-B66D-3E13733A5B2B}"/>
               </a:ext>
             </a:extLst>
           </p:cNvPr>
@@ -4896,7 +4912,7 @@
           <p:cNvPr id="5" name="Slide Number Placeholder 4">
             <a:extLst>
               <a:ext uri="{FF2B5EF4-FFF2-40B4-BE49-F238E27FC236}">
-                <a16:creationId xmlns:a16="http://schemas.microsoft.com/office/drawing/2014/main" id="{00D82C6C-9BFE-4C90-A547-8C325C55EAA2}"/>
+                <a16:creationId xmlns:a16="http://schemas.microsoft.com/office/drawing/2014/main" xmlns="" id="{00D82C6C-9BFE-4C90-A547-8C325C55EAA2}"/>
               </a:ext>
             </a:extLst>
           </p:cNvPr>
@@ -4914,6 +4930,7 @@
           <a:p>
             <a:fld id="{A1FD0E78-183D-4F7D-A18B-8A4BED7B6988}" type="slidenum">
               <a:rPr lang="en-US" smtClean="0"/>
+              <a:pPr/>
               <a:t>‹#›</a:t>
             </a:fld>
             <a:endParaRPr lang="en-US"/>
@@ -4923,7 +4940,7 @@
     </p:spTree>
     <p:extLst>
       <p:ext uri="{BB962C8B-B14F-4D97-AF65-F5344CB8AC3E}">
-        <p14:creationId xmlns:p14="http://schemas.microsoft.com/office/powerpoint/2010/main" val="3783065093"/>
+        <p14:creationId xmlns:p14="http://schemas.microsoft.com/office/powerpoint/2010/main" xmlns="" val="3783065093"/>
       </p:ext>
     </p:extLst>
   </p:cSld>
@@ -4955,7 +4972,7 @@
           <p:cNvPr id="5" name="Rectangle 4">
             <a:extLst>
               <a:ext uri="{FF2B5EF4-FFF2-40B4-BE49-F238E27FC236}">
-                <a16:creationId xmlns:a16="http://schemas.microsoft.com/office/drawing/2014/main" id="{F2FA0252-28E1-40E5-ACE6-20D14F5256B9}"/>
+                <a16:creationId xmlns:a16="http://schemas.microsoft.com/office/drawing/2014/main" xmlns="" id="{F2FA0252-28E1-40E5-ACE6-20D14F5256B9}"/>
               </a:ext>
             </a:extLst>
           </p:cNvPr>
@@ -5004,7 +5021,7 @@
           <p:cNvPr id="6" name="Rectangle 5">
             <a:extLst>
               <a:ext uri="{FF2B5EF4-FFF2-40B4-BE49-F238E27FC236}">
-                <a16:creationId xmlns:a16="http://schemas.microsoft.com/office/drawing/2014/main" id="{3E618FD9-31FC-4567-B182-23204706A8B0}"/>
+                <a16:creationId xmlns:a16="http://schemas.microsoft.com/office/drawing/2014/main" xmlns="" id="{3E618FD9-31FC-4567-B182-23204706A8B0}"/>
               </a:ext>
             </a:extLst>
           </p:cNvPr>
@@ -5061,7 +5078,7 @@
           <p:cNvPr id="7" name="Rectangle 6">
             <a:extLst>
               <a:ext uri="{FF2B5EF4-FFF2-40B4-BE49-F238E27FC236}">
-                <a16:creationId xmlns:a16="http://schemas.microsoft.com/office/drawing/2014/main" id="{0B29B7B4-B37A-4ECF-85D2-5A66AA4D9A3E}"/>
+                <a16:creationId xmlns:a16="http://schemas.microsoft.com/office/drawing/2014/main" xmlns="" id="{0B29B7B4-B37A-4ECF-85D2-5A66AA4D9A3E}"/>
               </a:ext>
             </a:extLst>
           </p:cNvPr>
@@ -5123,7 +5140,7 @@
           <p:cNvPr id="8" name="Rectangle 7">
             <a:extLst>
               <a:ext uri="{FF2B5EF4-FFF2-40B4-BE49-F238E27FC236}">
-                <a16:creationId xmlns:a16="http://schemas.microsoft.com/office/drawing/2014/main" id="{CCF4FB33-76DE-4704-8B1A-C3FE16F507E2}"/>
+                <a16:creationId xmlns:a16="http://schemas.microsoft.com/office/drawing/2014/main" xmlns="" id="{CCF4FB33-76DE-4704-8B1A-C3FE16F507E2}"/>
               </a:ext>
             </a:extLst>
           </p:cNvPr>
@@ -5185,7 +5202,7 @@
           <p:cNvPr id="9" name="Rectangle 8">
             <a:extLst>
               <a:ext uri="{FF2B5EF4-FFF2-40B4-BE49-F238E27FC236}">
-                <a16:creationId xmlns:a16="http://schemas.microsoft.com/office/drawing/2014/main" id="{58A894C9-4BA3-403A-B5F2-D596A188AF2F}"/>
+                <a16:creationId xmlns:a16="http://schemas.microsoft.com/office/drawing/2014/main" xmlns="" id="{58A894C9-4BA3-403A-B5F2-D596A188AF2F}"/>
               </a:ext>
             </a:extLst>
           </p:cNvPr>
@@ -5247,7 +5264,7 @@
           <p:cNvPr id="10" name="Rectangle 9">
             <a:extLst>
               <a:ext uri="{FF2B5EF4-FFF2-40B4-BE49-F238E27FC236}">
-                <a16:creationId xmlns:a16="http://schemas.microsoft.com/office/drawing/2014/main" id="{970B9174-D03E-4D6F-A8E5-B9D3C8C2DB80}"/>
+                <a16:creationId xmlns:a16="http://schemas.microsoft.com/office/drawing/2014/main" xmlns="" id="{970B9174-D03E-4D6F-A8E5-B9D3C8C2DB80}"/>
               </a:ext>
             </a:extLst>
           </p:cNvPr>
@@ -5309,7 +5326,7 @@
           <p:cNvPr id="11" name="Picture 10">
             <a:extLst>
               <a:ext uri="{FF2B5EF4-FFF2-40B4-BE49-F238E27FC236}">
-                <a16:creationId xmlns:a16="http://schemas.microsoft.com/office/drawing/2014/main" id="{16EAC91E-9BE5-4729-AA9E-F5E9394A8D1C}"/>
+                <a16:creationId xmlns:a16="http://schemas.microsoft.com/office/drawing/2014/main" xmlns="" id="{16EAC91E-9BE5-4729-AA9E-F5E9394A8D1C}"/>
               </a:ext>
             </a:extLst>
           </p:cNvPr>
@@ -5319,10 +5336,10 @@
           <p:nvPr/>
         </p:nvPicPr>
         <p:blipFill>
-          <a:blip r:embed="rId2">
+          <a:blip r:embed="rId2" cstate="print">
             <a:extLst>
               <a:ext uri="{28A0092B-C50C-407E-A947-70E740481C1C}">
-                <a14:useLocalDpi xmlns:a14="http://schemas.microsoft.com/office/drawing/2010/main" val="0"/>
+                <a14:useLocalDpi xmlns:a14="http://schemas.microsoft.com/office/drawing/2010/main" xmlns="" val="0"/>
               </a:ext>
             </a:extLst>
           </a:blip>
@@ -5345,7 +5362,7 @@
           <p:cNvPr id="2" name="Date Placeholder 1">
             <a:extLst>
               <a:ext uri="{FF2B5EF4-FFF2-40B4-BE49-F238E27FC236}">
-                <a16:creationId xmlns:a16="http://schemas.microsoft.com/office/drawing/2014/main" id="{7839A89A-4F67-468F-80FE-0E3680B1A7D2}"/>
+                <a16:creationId xmlns:a16="http://schemas.microsoft.com/office/drawing/2014/main" xmlns="" id="{7839A89A-4F67-468F-80FE-0E3680B1A7D2}"/>
               </a:ext>
             </a:extLst>
           </p:cNvPr>
@@ -5363,7 +5380,8 @@
           <a:p>
             <a:fld id="{D2474CCF-98B4-411A-8810-C31E8C29E19B}" type="datetimeFigureOut">
               <a:rPr lang="en-US" smtClean="0"/>
-              <a:t>6/11/2022</a:t>
+              <a:pPr/>
+              <a:t>7/6/2023</a:t>
             </a:fld>
             <a:endParaRPr lang="en-US"/>
           </a:p>
@@ -5374,7 +5392,7 @@
           <p:cNvPr id="3" name="Footer Placeholder 2">
             <a:extLst>
               <a:ext uri="{FF2B5EF4-FFF2-40B4-BE49-F238E27FC236}">
-                <a16:creationId xmlns:a16="http://schemas.microsoft.com/office/drawing/2014/main" id="{5C101976-8FCF-4B4F-B90A-B5E724625AE4}"/>
+                <a16:creationId xmlns:a16="http://schemas.microsoft.com/office/drawing/2014/main" xmlns="" id="{5C101976-8FCF-4B4F-B90A-B5E724625AE4}"/>
               </a:ext>
             </a:extLst>
           </p:cNvPr>
@@ -5399,7 +5417,7 @@
           <p:cNvPr id="4" name="Slide Number Placeholder 3">
             <a:extLst>
               <a:ext uri="{FF2B5EF4-FFF2-40B4-BE49-F238E27FC236}">
-                <a16:creationId xmlns:a16="http://schemas.microsoft.com/office/drawing/2014/main" id="{706AE299-AC97-4CB0-8712-61CB13DAB778}"/>
+                <a16:creationId xmlns:a16="http://schemas.microsoft.com/office/drawing/2014/main" xmlns="" id="{706AE299-AC97-4CB0-8712-61CB13DAB778}"/>
               </a:ext>
             </a:extLst>
           </p:cNvPr>
@@ -5417,6 +5435,7 @@
           <a:p>
             <a:fld id="{A1FD0E78-183D-4F7D-A18B-8A4BED7B6988}" type="slidenum">
               <a:rPr lang="en-US" smtClean="0"/>
+              <a:pPr/>
               <a:t>‹#›</a:t>
             </a:fld>
             <a:endParaRPr lang="en-US"/>
@@ -5426,7 +5445,7 @@
     </p:spTree>
     <p:extLst>
       <p:ext uri="{BB962C8B-B14F-4D97-AF65-F5344CB8AC3E}">
-        <p14:creationId xmlns:p14="http://schemas.microsoft.com/office/powerpoint/2010/main" val="3528334488"/>
+        <p14:creationId xmlns:p14="http://schemas.microsoft.com/office/powerpoint/2010/main" xmlns="" val="3528334488"/>
       </p:ext>
     </p:extLst>
   </p:cSld>
@@ -5458,7 +5477,7 @@
           <p:cNvPr id="2" name="Title 1">
             <a:extLst>
               <a:ext uri="{FF2B5EF4-FFF2-40B4-BE49-F238E27FC236}">
-                <a16:creationId xmlns:a16="http://schemas.microsoft.com/office/drawing/2014/main" id="{0AB6CCC9-CB97-4066-B6DA-4148BB88F608}"/>
+                <a16:creationId xmlns:a16="http://schemas.microsoft.com/office/drawing/2014/main" xmlns="" id="{0AB6CCC9-CB97-4066-B6DA-4148BB88F608}"/>
               </a:ext>
             </a:extLst>
           </p:cNvPr>
@@ -5495,7 +5514,7 @@
           <p:cNvPr id="3" name="Content Placeholder 2">
             <a:extLst>
               <a:ext uri="{FF2B5EF4-FFF2-40B4-BE49-F238E27FC236}">
-                <a16:creationId xmlns:a16="http://schemas.microsoft.com/office/drawing/2014/main" id="{F8B6ECEE-E57D-455E-A22A-6DE67E6B8B65}"/>
+                <a16:creationId xmlns:a16="http://schemas.microsoft.com/office/drawing/2014/main" xmlns="" id="{F8B6ECEE-E57D-455E-A22A-6DE67E6B8B65}"/>
               </a:ext>
             </a:extLst>
           </p:cNvPr>
@@ -5585,7 +5604,7 @@
           <p:cNvPr id="4" name="Text Placeholder 3">
             <a:extLst>
               <a:ext uri="{FF2B5EF4-FFF2-40B4-BE49-F238E27FC236}">
-                <a16:creationId xmlns:a16="http://schemas.microsoft.com/office/drawing/2014/main" id="{23E2D1F0-214E-43F0-A7BC-42F93E547BE6}"/>
+                <a16:creationId xmlns:a16="http://schemas.microsoft.com/office/drawing/2014/main" xmlns="" id="{23E2D1F0-214E-43F0-A7BC-42F93E547BE6}"/>
               </a:ext>
             </a:extLst>
           </p:cNvPr>
@@ -5656,7 +5675,7 @@
           <p:cNvPr id="5" name="Date Placeholder 4">
             <a:extLst>
               <a:ext uri="{FF2B5EF4-FFF2-40B4-BE49-F238E27FC236}">
-                <a16:creationId xmlns:a16="http://schemas.microsoft.com/office/drawing/2014/main" id="{D0B125E7-FC1E-4111-8E29-520E9E6AFC29}"/>
+                <a16:creationId xmlns:a16="http://schemas.microsoft.com/office/drawing/2014/main" xmlns="" id="{D0B125E7-FC1E-4111-8E29-520E9E6AFC29}"/>
               </a:ext>
             </a:extLst>
           </p:cNvPr>
@@ -5674,7 +5693,8 @@
           <a:p>
             <a:fld id="{D2474CCF-98B4-411A-8810-C31E8C29E19B}" type="datetimeFigureOut">
               <a:rPr lang="en-US" smtClean="0"/>
-              <a:t>6/11/2022</a:t>
+              <a:pPr/>
+              <a:t>7/6/2023</a:t>
             </a:fld>
             <a:endParaRPr lang="en-US"/>
           </a:p>
@@ -5685,7 +5705,7 @@
           <p:cNvPr id="6" name="Footer Placeholder 5">
             <a:extLst>
               <a:ext uri="{FF2B5EF4-FFF2-40B4-BE49-F238E27FC236}">
-                <a16:creationId xmlns:a16="http://schemas.microsoft.com/office/drawing/2014/main" id="{856E390C-8CD6-41DF-B8A7-0EA86E70449B}"/>
+                <a16:creationId xmlns:a16="http://schemas.microsoft.com/office/drawing/2014/main" xmlns="" id="{856E390C-8CD6-41DF-B8A7-0EA86E70449B}"/>
               </a:ext>
             </a:extLst>
           </p:cNvPr>
@@ -5710,7 +5730,7 @@
           <p:cNvPr id="7" name="Slide Number Placeholder 6">
             <a:extLst>
               <a:ext uri="{FF2B5EF4-FFF2-40B4-BE49-F238E27FC236}">
-                <a16:creationId xmlns:a16="http://schemas.microsoft.com/office/drawing/2014/main" id="{F24D1209-8122-481B-93F3-CD9D18358AD5}"/>
+                <a16:creationId xmlns:a16="http://schemas.microsoft.com/office/drawing/2014/main" xmlns="" id="{F24D1209-8122-481B-93F3-CD9D18358AD5}"/>
               </a:ext>
             </a:extLst>
           </p:cNvPr>
@@ -5728,6 +5748,7 @@
           <a:p>
             <a:fld id="{A1FD0E78-183D-4F7D-A18B-8A4BED7B6988}" type="slidenum">
               <a:rPr lang="en-US" smtClean="0"/>
+              <a:pPr/>
               <a:t>‹#›</a:t>
             </a:fld>
             <a:endParaRPr lang="en-US"/>
@@ -5737,7 +5758,7 @@
     </p:spTree>
     <p:extLst>
       <p:ext uri="{BB962C8B-B14F-4D97-AF65-F5344CB8AC3E}">
-        <p14:creationId xmlns:p14="http://schemas.microsoft.com/office/powerpoint/2010/main" val="2872829762"/>
+        <p14:creationId xmlns:p14="http://schemas.microsoft.com/office/powerpoint/2010/main" xmlns="" val="2872829762"/>
       </p:ext>
     </p:extLst>
   </p:cSld>
@@ -5769,7 +5790,7 @@
           <p:cNvPr id="2" name="Title 1">
             <a:extLst>
               <a:ext uri="{FF2B5EF4-FFF2-40B4-BE49-F238E27FC236}">
-                <a16:creationId xmlns:a16="http://schemas.microsoft.com/office/drawing/2014/main" id="{D0421060-B002-4A29-A677-95E1A92CC3EB}"/>
+                <a16:creationId xmlns:a16="http://schemas.microsoft.com/office/drawing/2014/main" xmlns="" id="{D0421060-B002-4A29-A677-95E1A92CC3EB}"/>
               </a:ext>
             </a:extLst>
           </p:cNvPr>
@@ -5806,7 +5827,7 @@
           <p:cNvPr id="3" name="Picture Placeholder 2">
             <a:extLst>
               <a:ext uri="{FF2B5EF4-FFF2-40B4-BE49-F238E27FC236}">
-                <a16:creationId xmlns:a16="http://schemas.microsoft.com/office/drawing/2014/main" id="{4DA23B8C-6470-4EFE-BA18-C7C748C1CA29}"/>
+                <a16:creationId xmlns:a16="http://schemas.microsoft.com/office/drawing/2014/main" xmlns="" id="{4DA23B8C-6470-4EFE-BA18-C7C748C1CA29}"/>
               </a:ext>
             </a:extLst>
           </p:cNvPr>
@@ -5876,7 +5897,7 @@
           <p:cNvPr id="4" name="Text Placeholder 3">
             <a:extLst>
               <a:ext uri="{FF2B5EF4-FFF2-40B4-BE49-F238E27FC236}">
-                <a16:creationId xmlns:a16="http://schemas.microsoft.com/office/drawing/2014/main" id="{0C14D961-FD3B-461E-A88E-64AC4821E64F}"/>
+                <a16:creationId xmlns:a16="http://schemas.microsoft.com/office/drawing/2014/main" xmlns="" id="{0C14D961-FD3B-461E-A88E-64AC4821E64F}"/>
               </a:ext>
             </a:extLst>
           </p:cNvPr>
@@ -5947,7 +5968,7 @@
           <p:cNvPr id="5" name="Date Placeholder 4">
             <a:extLst>
               <a:ext uri="{FF2B5EF4-FFF2-40B4-BE49-F238E27FC236}">
-                <a16:creationId xmlns:a16="http://schemas.microsoft.com/office/drawing/2014/main" id="{C64AF84C-0554-4D2A-95E2-84C361AAEDFA}"/>
+                <a16:creationId xmlns:a16="http://schemas.microsoft.com/office/drawing/2014/main" xmlns="" id="{C64AF84C-0554-4D2A-95E2-84C361AAEDFA}"/>
               </a:ext>
             </a:extLst>
           </p:cNvPr>
@@ -5965,7 +5986,8 @@
           <a:p>
             <a:fld id="{D2474CCF-98B4-411A-8810-C31E8C29E19B}" type="datetimeFigureOut">
               <a:rPr lang="en-US" smtClean="0"/>
-              <a:t>6/11/2022</a:t>
+              <a:pPr/>
+              <a:t>7/6/2023</a:t>
             </a:fld>
             <a:endParaRPr lang="en-US"/>
           </a:p>
@@ -5976,7 +5998,7 @@
           <p:cNvPr id="6" name="Footer Placeholder 5">
             <a:extLst>
               <a:ext uri="{FF2B5EF4-FFF2-40B4-BE49-F238E27FC236}">
-                <a16:creationId xmlns:a16="http://schemas.microsoft.com/office/drawing/2014/main" id="{682BC5B5-70F3-4D7C-9421-4846A194AF84}"/>
+                <a16:creationId xmlns:a16="http://schemas.microsoft.com/office/drawing/2014/main" xmlns="" id="{682BC5B5-70F3-4D7C-9421-4846A194AF84}"/>
               </a:ext>
             </a:extLst>
           </p:cNvPr>
@@ -6001,7 +6023,7 @@
           <p:cNvPr id="7" name="Slide Number Placeholder 6">
             <a:extLst>
               <a:ext uri="{FF2B5EF4-FFF2-40B4-BE49-F238E27FC236}">
-                <a16:creationId xmlns:a16="http://schemas.microsoft.com/office/drawing/2014/main" id="{040C9E27-8F16-42E6-B25A-6357B56B30CB}"/>
+                <a16:creationId xmlns:a16="http://schemas.microsoft.com/office/drawing/2014/main" xmlns="" id="{040C9E27-8F16-42E6-B25A-6357B56B30CB}"/>
               </a:ext>
             </a:extLst>
           </p:cNvPr>
@@ -6019,6 +6041,7 @@
           <a:p>
             <a:fld id="{A1FD0E78-183D-4F7D-A18B-8A4BED7B6988}" type="slidenum">
               <a:rPr lang="en-US" smtClean="0"/>
+              <a:pPr/>
               <a:t>‹#›</a:t>
             </a:fld>
             <a:endParaRPr lang="en-US"/>
@@ -6028,7 +6051,7 @@
     </p:spTree>
     <p:extLst>
       <p:ext uri="{BB962C8B-B14F-4D97-AF65-F5344CB8AC3E}">
-        <p14:creationId xmlns:p14="http://schemas.microsoft.com/office/powerpoint/2010/main" val="3978059408"/>
+        <p14:creationId xmlns:p14="http://schemas.microsoft.com/office/powerpoint/2010/main" xmlns="" val="3978059408"/>
       </p:ext>
     </p:extLst>
   </p:cSld>
@@ -6065,7 +6088,7 @@
           <p:cNvPr id="2" name="Title Placeholder 1">
             <a:extLst>
               <a:ext uri="{FF2B5EF4-FFF2-40B4-BE49-F238E27FC236}">
-                <a16:creationId xmlns:a16="http://schemas.microsoft.com/office/drawing/2014/main" id="{5672EF02-B3FB-409B-B71D-7DB59224D03E}"/>
+                <a16:creationId xmlns:a16="http://schemas.microsoft.com/office/drawing/2014/main" xmlns="" id="{5672EF02-B3FB-409B-B71D-7DB59224D03E}"/>
               </a:ext>
             </a:extLst>
           </p:cNvPr>
@@ -6103,7 +6126,7 @@
           <p:cNvPr id="3" name="Text Placeholder 2">
             <a:extLst>
               <a:ext uri="{FF2B5EF4-FFF2-40B4-BE49-F238E27FC236}">
-                <a16:creationId xmlns:a16="http://schemas.microsoft.com/office/drawing/2014/main" id="{1FD66FC5-8BC1-45FA-8841-F34FA58FDF13}"/>
+                <a16:creationId xmlns:a16="http://schemas.microsoft.com/office/drawing/2014/main" xmlns="" id="{1FD66FC5-8BC1-45FA-8841-F34FA58FDF13}"/>
               </a:ext>
             </a:extLst>
           </p:cNvPr>
@@ -6170,7 +6193,7 @@
           <p:cNvPr id="4" name="Date Placeholder 3">
             <a:extLst>
               <a:ext uri="{FF2B5EF4-FFF2-40B4-BE49-F238E27FC236}">
-                <a16:creationId xmlns:a16="http://schemas.microsoft.com/office/drawing/2014/main" id="{4107B98F-173F-4961-A753-124D5F25AED6}"/>
+                <a16:creationId xmlns:a16="http://schemas.microsoft.com/office/drawing/2014/main" xmlns="" id="{4107B98F-173F-4961-A753-124D5F25AED6}"/>
               </a:ext>
             </a:extLst>
           </p:cNvPr>
@@ -6206,7 +6229,8 @@
           <a:p>
             <a:fld id="{D2474CCF-98B4-411A-8810-C31E8C29E19B}" type="datetimeFigureOut">
               <a:rPr lang="en-US" smtClean="0"/>
-              <a:t>6/11/2022</a:t>
+              <a:pPr/>
+              <a:t>7/6/2023</a:t>
             </a:fld>
             <a:endParaRPr lang="en-US"/>
           </a:p>
@@ -6217,7 +6241,7 @@
           <p:cNvPr id="5" name="Footer Placeholder 4">
             <a:extLst>
               <a:ext uri="{FF2B5EF4-FFF2-40B4-BE49-F238E27FC236}">
-                <a16:creationId xmlns:a16="http://schemas.microsoft.com/office/drawing/2014/main" id="{69DB7A21-CD9E-479E-AAB2-6CC376E9F692}"/>
+                <a16:creationId xmlns:a16="http://schemas.microsoft.com/office/drawing/2014/main" xmlns="" id="{69DB7A21-CD9E-479E-AAB2-6CC376E9F692}"/>
               </a:ext>
             </a:extLst>
           </p:cNvPr>
@@ -6260,7 +6284,7 @@
           <p:cNvPr id="6" name="Slide Number Placeholder 5">
             <a:extLst>
               <a:ext uri="{FF2B5EF4-FFF2-40B4-BE49-F238E27FC236}">
-                <a16:creationId xmlns:a16="http://schemas.microsoft.com/office/drawing/2014/main" id="{C6ABC126-58FF-4F4D-A936-FEFCC877EF3A}"/>
+                <a16:creationId xmlns:a16="http://schemas.microsoft.com/office/drawing/2014/main" xmlns="" id="{C6ABC126-58FF-4F4D-A936-FEFCC877EF3A}"/>
               </a:ext>
             </a:extLst>
           </p:cNvPr>
@@ -6296,6 +6320,7 @@
           <a:p>
             <a:fld id="{A1FD0E78-183D-4F7D-A18B-8A4BED7B6988}" type="slidenum">
               <a:rPr lang="en-US" smtClean="0"/>
+              <a:pPr/>
               <a:t>‹#›</a:t>
             </a:fld>
             <a:endParaRPr lang="en-US"/>
@@ -6305,7 +6330,7 @@
     </p:spTree>
     <p:extLst>
       <p:ext uri="{BB962C8B-B14F-4D97-AF65-F5344CB8AC3E}">
-        <p14:creationId xmlns:p14="http://schemas.microsoft.com/office/powerpoint/2010/main" val="3606927380"/>
+        <p14:creationId xmlns:p14="http://schemas.microsoft.com/office/powerpoint/2010/main" xmlns="" val="3606927380"/>
       </p:ext>
     </p:extLst>
   </p:cSld>
@@ -6628,7 +6653,7 @@
           <p:cNvPr id="2" name="Title 1">
             <a:extLst>
               <a:ext uri="{FF2B5EF4-FFF2-40B4-BE49-F238E27FC236}">
-                <a16:creationId xmlns:a16="http://schemas.microsoft.com/office/drawing/2014/main" id="{C70F88C2-D62C-496E-8359-A6E42ABBE5C2}"/>
+                <a16:creationId xmlns:a16="http://schemas.microsoft.com/office/drawing/2014/main" xmlns="" id="{C70F88C2-D62C-496E-8359-A6E42ABBE5C2}"/>
               </a:ext>
             </a:extLst>
           </p:cNvPr>
@@ -6696,7 +6721,7 @@
           <p:cNvPr id="3" name="Subtitle 2">
             <a:extLst>
               <a:ext uri="{FF2B5EF4-FFF2-40B4-BE49-F238E27FC236}">
-                <a16:creationId xmlns:a16="http://schemas.microsoft.com/office/drawing/2014/main" id="{D66627D2-8B6B-4DCC-9D83-1FA969EFAFA0}"/>
+                <a16:creationId xmlns:a16="http://schemas.microsoft.com/office/drawing/2014/main" xmlns="" id="{D66627D2-8B6B-4DCC-9D83-1FA969EFAFA0}"/>
               </a:ext>
             </a:extLst>
           </p:cNvPr>
@@ -6737,7 +6762,7 @@
     </p:spTree>
     <p:extLst>
       <p:ext uri="{BB962C8B-B14F-4D97-AF65-F5344CB8AC3E}">
-        <p14:creationId xmlns:p14="http://schemas.microsoft.com/office/powerpoint/2010/main" val="926091206"/>
+        <p14:creationId xmlns:p14="http://schemas.microsoft.com/office/powerpoint/2010/main" xmlns="" val="926091206"/>
       </p:ext>
     </p:extLst>
   </p:cSld>
@@ -6769,7 +6794,7 @@
           <p:cNvPr id="2" name="Title 1">
             <a:extLst>
               <a:ext uri="{FF2B5EF4-FFF2-40B4-BE49-F238E27FC236}">
-                <a16:creationId xmlns:a16="http://schemas.microsoft.com/office/drawing/2014/main" id="{45F33AFC-C220-4038-ACF0-E5D4B3B57FD0}"/>
+                <a16:creationId xmlns:a16="http://schemas.microsoft.com/office/drawing/2014/main" xmlns="" id="{45F33AFC-C220-4038-ACF0-E5D4B3B57FD0}"/>
               </a:ext>
             </a:extLst>
           </p:cNvPr>
@@ -6814,7 +6839,7 @@
           <p:cNvPr id="4" name="Content Placeholder 3">
             <a:extLst>
               <a:ext uri="{FF2B5EF4-FFF2-40B4-BE49-F238E27FC236}">
-                <a16:creationId xmlns:a16="http://schemas.microsoft.com/office/drawing/2014/main" id="{0146DD26-E59E-4BAA-A74F-05E44312CC29}"/>
+                <a16:creationId xmlns:a16="http://schemas.microsoft.com/office/drawing/2014/main" xmlns="" id="{0146DD26-E59E-4BAA-A74F-05E44312CC29}"/>
               </a:ext>
             </a:extLst>
           </p:cNvPr>
@@ -6884,7 +6909,7 @@
           <p:cNvPr id="5" name="TextBox 4">
             <a:extLst>
               <a:ext uri="{FF2B5EF4-FFF2-40B4-BE49-F238E27FC236}">
-                <a16:creationId xmlns:a16="http://schemas.microsoft.com/office/drawing/2014/main" id="{2C961006-E57F-293D-6C22-ED9EB6B3B86B}"/>
+                <a16:creationId xmlns:a16="http://schemas.microsoft.com/office/drawing/2014/main" xmlns="" id="{2C961006-E57F-293D-6C22-ED9EB6B3B86B}"/>
               </a:ext>
             </a:extLst>
           </p:cNvPr>
@@ -6964,7 +6989,7 @@
     </p:spTree>
     <p:extLst>
       <p:ext uri="{BB962C8B-B14F-4D97-AF65-F5344CB8AC3E}">
-        <p14:creationId xmlns:p14="http://schemas.microsoft.com/office/powerpoint/2010/main" val="1071779574"/>
+        <p14:creationId xmlns:p14="http://schemas.microsoft.com/office/powerpoint/2010/main" xmlns="" val="1071779574"/>
       </p:ext>
     </p:extLst>
   </p:cSld>
@@ -6996,7 +7021,7 @@
           <p:cNvPr id="2" name="Title 1">
             <a:extLst>
               <a:ext uri="{FF2B5EF4-FFF2-40B4-BE49-F238E27FC236}">
-                <a16:creationId xmlns:a16="http://schemas.microsoft.com/office/drawing/2014/main" id="{66B5CEFB-8991-8C6A-913B-91FD877B537A}"/>
+                <a16:creationId xmlns:a16="http://schemas.microsoft.com/office/drawing/2014/main" xmlns="" id="{66B5CEFB-8991-8C6A-913B-91FD877B537A}"/>
               </a:ext>
             </a:extLst>
           </p:cNvPr>
@@ -7041,7 +7066,7 @@
           <p:cNvPr id="4" name="TextBox 3">
             <a:extLst>
               <a:ext uri="{FF2B5EF4-FFF2-40B4-BE49-F238E27FC236}">
-                <a16:creationId xmlns:a16="http://schemas.microsoft.com/office/drawing/2014/main" id="{619BA313-C27C-34BD-EFC9-4C7D296EBC4E}"/>
+                <a16:creationId xmlns:a16="http://schemas.microsoft.com/office/drawing/2014/main" xmlns="" id="{619BA313-C27C-34BD-EFC9-4C7D296EBC4E}"/>
               </a:ext>
             </a:extLst>
           </p:cNvPr>
@@ -7150,6 +7175,16 @@
                 <a:latin typeface="open sans" panose="020B0606030504020204" pitchFamily="34" charset="0"/>
               </a:rPr>
               <a:t>ApplicationPartManager</a:t>
+            </a:r>
+            <a:r>
+              <a:rPr lang="en-US" b="0" i="1" dirty="0">
+                <a:solidFill>
+                  <a:srgbClr val="212121"/>
+                </a:solidFill>
+                <a:effectLst/>
+                <a:latin typeface="open sans" panose="020B0606030504020204" pitchFamily="34" charset="0"/>
+              </a:rPr>
+              <a:t/>
             </a:r>
             <a:br>
               <a:rPr lang="en-US" b="0" i="1" dirty="0">
@@ -7240,6 +7275,16 @@
                 <a:latin typeface="open sans" panose="020B0606030504020204" pitchFamily="34" charset="0"/>
               </a:rPr>
             </a:br>
+            <a:r>
+              <a:rPr lang="en-US" b="0" i="0" dirty="0">
+                <a:solidFill>
+                  <a:srgbClr val="212121"/>
+                </a:solidFill>
+                <a:effectLst/>
+                <a:latin typeface="open sans" panose="020B0606030504020204" pitchFamily="34" charset="0"/>
+              </a:rPr>
+              <a:t/>
+            </a:r>
             <a:br>
               <a:rPr lang="en-US" b="0" i="0" dirty="0">
                 <a:solidFill>
@@ -7310,6 +7355,16 @@
                 <a:latin typeface="open sans" panose="020B0606030504020204" pitchFamily="34" charset="0"/>
               </a:rPr>
             </a:br>
+            <a:r>
+              <a:rPr lang="en-US" b="0" i="0" dirty="0">
+                <a:solidFill>
+                  <a:srgbClr val="212121"/>
+                </a:solidFill>
+                <a:effectLst/>
+                <a:latin typeface="open sans" panose="020B0606030504020204" pitchFamily="34" charset="0"/>
+              </a:rPr>
+              <a:t/>
+            </a:r>
             <a:br>
               <a:rPr lang="en-US" b="0" i="0" dirty="0">
                 <a:solidFill>
@@ -7377,7 +7432,7 @@
     </p:spTree>
     <p:extLst>
       <p:ext uri="{BB962C8B-B14F-4D97-AF65-F5344CB8AC3E}">
-        <p14:creationId xmlns:p14="http://schemas.microsoft.com/office/powerpoint/2010/main" val="2812963956"/>
+        <p14:creationId xmlns:p14="http://schemas.microsoft.com/office/powerpoint/2010/main" xmlns="" val="2812963956"/>
       </p:ext>
     </p:extLst>
   </p:cSld>
@@ -7409,7 +7464,7 @@
           <p:cNvPr id="2" name="Title 1">
             <a:extLst>
               <a:ext uri="{FF2B5EF4-FFF2-40B4-BE49-F238E27FC236}">
-                <a16:creationId xmlns:a16="http://schemas.microsoft.com/office/drawing/2014/main" id="{583C52A8-E9CD-F2BB-277D-2D2217817AD3}"/>
+                <a16:creationId xmlns:a16="http://schemas.microsoft.com/office/drawing/2014/main" xmlns="" id="{583C52A8-E9CD-F2BB-277D-2D2217817AD3}"/>
               </a:ext>
             </a:extLst>
           </p:cNvPr>
@@ -7464,7 +7519,7 @@
           <p:cNvPr id="4" name="TextBox 3">
             <a:extLst>
               <a:ext uri="{FF2B5EF4-FFF2-40B4-BE49-F238E27FC236}">
-                <a16:creationId xmlns:a16="http://schemas.microsoft.com/office/drawing/2014/main" id="{313AAD83-6CC0-C9FA-93F1-88E8A237D192}"/>
+                <a16:creationId xmlns:a16="http://schemas.microsoft.com/office/drawing/2014/main" xmlns="" id="{313AAD83-6CC0-C9FA-93F1-88E8A237D192}"/>
               </a:ext>
             </a:extLst>
           </p:cNvPr>
@@ -7855,7 +7910,7 @@
     </p:spTree>
     <p:extLst>
       <p:ext uri="{BB962C8B-B14F-4D97-AF65-F5344CB8AC3E}">
-        <p14:creationId xmlns:p14="http://schemas.microsoft.com/office/powerpoint/2010/main" val="2733729204"/>
+        <p14:creationId xmlns:p14="http://schemas.microsoft.com/office/powerpoint/2010/main" xmlns="" val="2733729204"/>
       </p:ext>
     </p:extLst>
   </p:cSld>
@@ -7884,13 +7939,7 @@
       </p:grpSpPr>
       <p:sp>
         <p:nvSpPr>
-          <p:cNvPr id="4" name="Title 3">
-            <a:extLst>
-              <a:ext uri="{FF2B5EF4-FFF2-40B4-BE49-F238E27FC236}">
-                <a16:creationId xmlns:a16="http://schemas.microsoft.com/office/drawing/2014/main" id="{6A7E5E61-13E2-4755-865D-C70C8D050323}"/>
-              </a:ext>
-            </a:extLst>
-          </p:cNvPr>
+          <p:cNvPr id="2" name="Title 1"/>
           <p:cNvSpPr>
             <a:spLocks noGrp="1"/>
           </p:cNvSpPr>
@@ -7903,6 +7952,148 @@
           <a:bodyPr/>
           <a:lstStyle/>
           <a:p>
+            <a:endParaRPr lang="en-US"/>
+          </a:p>
+        </p:txBody>
+      </p:sp>
+      <p:sp>
+        <p:nvSpPr>
+          <p:cNvPr id="1026" name="AutoShape 2" descr="AddController() vs AddMvc() vs AddControllersWithViews() vs AddRazorPages() method in ASP.NET Core application"/>
+          <p:cNvSpPr>
+            <a:spLocks noChangeAspect="1" noChangeArrowheads="1"/>
+          </p:cNvSpPr>
+          <p:nvPr/>
+        </p:nvSpPr>
+        <p:spPr bwMode="auto">
+          <a:xfrm>
+            <a:off x="155575" y="-144463"/>
+            <a:ext cx="304800" cy="304801"/>
+          </a:xfrm>
+          <a:prstGeom prst="rect">
+            <a:avLst/>
+          </a:prstGeom>
+          <a:noFill/>
+        </p:spPr>
+        <p:txBody>
+          <a:bodyPr vert="horz" wrap="square" lIns="91440" tIns="45720" rIns="91440" bIns="45720" numCol="1" anchor="t" anchorCtr="0" compatLnSpc="1">
+            <a:prstTxWarp prst="textNoShape">
+              <a:avLst/>
+            </a:prstTxWarp>
+          </a:bodyPr>
+          <a:lstStyle/>
+          <a:p>
+            <a:endParaRPr lang="en-US"/>
+          </a:p>
+        </p:txBody>
+      </p:sp>
+      <p:sp>
+        <p:nvSpPr>
+          <p:cNvPr id="1028" name="AutoShape 4" descr="AddController() vs AddMvc() vs AddControllersWithViews() vs AddRazorPages() method in ASP.NET Core application"/>
+          <p:cNvSpPr>
+            <a:spLocks noChangeAspect="1" noChangeArrowheads="1"/>
+          </p:cNvSpPr>
+          <p:nvPr/>
+        </p:nvSpPr>
+        <p:spPr bwMode="auto">
+          <a:xfrm>
+            <a:off x="155575" y="-144463"/>
+            <a:ext cx="304800" cy="304801"/>
+          </a:xfrm>
+          <a:prstGeom prst="rect">
+            <a:avLst/>
+          </a:prstGeom>
+          <a:noFill/>
+        </p:spPr>
+        <p:txBody>
+          <a:bodyPr vert="horz" wrap="square" lIns="91440" tIns="45720" rIns="91440" bIns="45720" numCol="1" anchor="t" anchorCtr="0" compatLnSpc="1">
+            <a:prstTxWarp prst="textNoShape">
+              <a:avLst/>
+            </a:prstTxWarp>
+          </a:bodyPr>
+          <a:lstStyle/>
+          <a:p>
+            <a:endParaRPr lang="en-US"/>
+          </a:p>
+        </p:txBody>
+      </p:sp>
+      <p:pic>
+        <p:nvPicPr>
+          <p:cNvPr id="1029" name="Picture 5"/>
+          <p:cNvPicPr>
+            <a:picLocks noChangeAspect="1" noChangeArrowheads="1"/>
+          </p:cNvPicPr>
+          <p:nvPr/>
+        </p:nvPicPr>
+        <p:blipFill>
+          <a:blip r:embed="rId2" cstate="print"/>
+          <a:srcRect l="33409" t="27475" r="11023" b="29697"/>
+          <a:stretch>
+            <a:fillRect/>
+          </a:stretch>
+        </p:blipFill>
+        <p:spPr bwMode="auto">
+          <a:xfrm>
+            <a:off x="304800" y="0"/>
+            <a:ext cx="11887200" cy="6857999"/>
+          </a:xfrm>
+          <a:prstGeom prst="rect">
+            <a:avLst/>
+          </a:prstGeom>
+          <a:noFill/>
+          <a:ln w="9525">
+            <a:noFill/>
+            <a:miter lim="800000"/>
+            <a:headEnd/>
+            <a:tailEnd/>
+          </a:ln>
+        </p:spPr>
+      </p:pic>
+    </p:spTree>
+  </p:cSld>
+  <p:clrMapOvr>
+    <a:masterClrMapping/>
+  </p:clrMapOvr>
+</p:sld>
+</file>
+
+<file path=ppt/slides/slide6.xml><?xml version="1.0" encoding="utf-8"?>
+<p:sld xmlns:a="http://schemas.openxmlformats.org/drawingml/2006/main" xmlns:r="http://schemas.openxmlformats.org/officeDocument/2006/relationships" xmlns:p="http://schemas.openxmlformats.org/presentationml/2006/main">
+  <p:cSld>
+    <p:spTree>
+      <p:nvGrpSpPr>
+        <p:cNvPr id="1" name=""/>
+        <p:cNvGrpSpPr/>
+        <p:nvPr/>
+      </p:nvGrpSpPr>
+      <p:grpSpPr>
+        <a:xfrm>
+          <a:off x="0" y="0"/>
+          <a:ext cx="0" cy="0"/>
+          <a:chOff x="0" y="0"/>
+          <a:chExt cx="0" cy="0"/>
+        </a:xfrm>
+      </p:grpSpPr>
+      <p:sp>
+        <p:nvSpPr>
+          <p:cNvPr id="4" name="Title 3">
+            <a:extLst>
+              <a:ext uri="{FF2B5EF4-FFF2-40B4-BE49-F238E27FC236}">
+                <a16:creationId xmlns:a16="http://schemas.microsoft.com/office/drawing/2014/main" xmlns="" id="{6A7E5E61-13E2-4755-865D-C70C8D050323}"/>
+              </a:ext>
+            </a:extLst>
+          </p:cNvPr>
+          <p:cNvSpPr>
+            <a:spLocks noGrp="1"/>
+          </p:cNvSpPr>
+          <p:nvPr>
+            <p:ph type="title"/>
+          </p:nvPr>
+        </p:nvSpPr>
+        <p:spPr/>
+        <p:txBody>
+          <a:bodyPr/>
+          <a:lstStyle/>
+          <a:p>
             <a:r>
               <a:rPr lang="en-US" dirty="0"/>
               <a:t>Thank You</a:t>
@@ -7915,7 +8106,7 @@
           <p:cNvPr id="5" name="Text Placeholder 4">
             <a:extLst>
               <a:ext uri="{FF2B5EF4-FFF2-40B4-BE49-F238E27FC236}">
-                <a16:creationId xmlns:a16="http://schemas.microsoft.com/office/drawing/2014/main" id="{FEA8CE66-7498-4D1A-B413-025DF799C0EE}"/>
+                <a16:creationId xmlns:a16="http://schemas.microsoft.com/office/drawing/2014/main" xmlns="" id="{FEA8CE66-7498-4D1A-B413-025DF799C0EE}"/>
               </a:ext>
             </a:extLst>
           </p:cNvPr>
@@ -7938,7 +8129,7 @@
     </p:spTree>
     <p:extLst>
       <p:ext uri="{BB962C8B-B14F-4D97-AF65-F5344CB8AC3E}">
-        <p14:creationId xmlns:p14="http://schemas.microsoft.com/office/powerpoint/2010/main" val="3749363430"/>
+        <p14:creationId xmlns:p14="http://schemas.microsoft.com/office/powerpoint/2010/main" xmlns="" val="3749363430"/>
       </p:ext>
     </p:extLst>
   </p:cSld>
@@ -7991,7 +8182,7 @@
     </a:clrScheme>
     <a:fontScheme name="Office">
       <a:majorFont>
-        <a:latin typeface="Calibri Light" panose="020F0302020204030204"/>
+        <a:latin typeface="Calibri Light"/>
         <a:ea typeface=""/>
         <a:cs typeface=""/>
         <a:font script="Jpan" typeface="游ゴシック Light"/>
@@ -8043,7 +8234,7 @@
         <a:font script="Tfng" typeface="Ebrima"/>
       </a:majorFont>
       <a:minorFont>
-        <a:latin typeface="Calibri" panose="020F0502020204030204"/>
+        <a:latin typeface="Calibri"/>
         <a:ea typeface=""/>
         <a:cs typeface=""/>
         <a:font script="Jpan" typeface="游ゴシック"/>
@@ -8237,7 +8428,7 @@
   <a:extraClrSchemeLst/>
   <a:extLst>
     <a:ext uri="{05A4C25C-085E-4340-85A3-A5531E510DB2}">
-      <thm15:themeFamily xmlns:thm15="http://schemas.microsoft.com/office/thememl/2012/main" name="PPT format" id="{8A50584D-2DEE-47F4-8FEB-3F8557BFAA88}" vid="{CCFC1CB6-16DE-4034-A851-EBB2E5D2C37E}"/>
+      <thm15:themeFamily xmlns:thm15="http://schemas.microsoft.com/office/thememl/2012/main" xmlns="" name="PPT format" id="{8A50584D-2DEE-47F4-8FEB-3F8557BFAA88}" vid="{CCFC1CB6-16DE-4034-A851-EBB2E5D2C37E}"/>
     </a:ext>
   </a:extLst>
 </a:theme>

</xml_diff>